<commit_message>
Atualizacao de Slide de Disp Moveis
</commit_message>
<xml_diff>
--- a/GESTAO DE INFRAESTRUTURA - CCT0347/SLIDES/GI_ALB_20019_1_Aula07.pptx
+++ b/GESTAO DE INFRAESTRUTURA - CCT0347/SLIDES/GI_ALB_20019_1_Aula07.pptx
@@ -20,18 +20,18 @@
     <p:sldId id="344" r:id="rId8"/>
     <p:sldId id="354" r:id="rId9"/>
     <p:sldId id="353" r:id="rId10"/>
-    <p:sldId id="349" r:id="rId11"/>
-    <p:sldId id="350" r:id="rId12"/>
-    <p:sldId id="351" r:id="rId13"/>
-    <p:sldId id="352" r:id="rId14"/>
-    <p:sldId id="348" r:id="rId15"/>
-    <p:sldId id="323" r:id="rId16"/>
-    <p:sldId id="324" r:id="rId17"/>
-    <p:sldId id="325" r:id="rId18"/>
-    <p:sldId id="326" r:id="rId19"/>
-    <p:sldId id="327" r:id="rId20"/>
-    <p:sldId id="355" r:id="rId21"/>
-    <p:sldId id="328" r:id="rId22"/>
+    <p:sldId id="323" r:id="rId11"/>
+    <p:sldId id="349" r:id="rId12"/>
+    <p:sldId id="324" r:id="rId13"/>
+    <p:sldId id="350" r:id="rId14"/>
+    <p:sldId id="325" r:id="rId15"/>
+    <p:sldId id="351" r:id="rId16"/>
+    <p:sldId id="327" r:id="rId17"/>
+    <p:sldId id="326" r:id="rId18"/>
+    <p:sldId id="355" r:id="rId19"/>
+    <p:sldId id="352" r:id="rId20"/>
+    <p:sldId id="328" r:id="rId21"/>
+    <p:sldId id="348" r:id="rId22"/>
     <p:sldId id="329" r:id="rId23"/>
     <p:sldId id="347" r:id="rId24"/>
     <p:sldId id="330" r:id="rId25"/>
@@ -2485,7 +2485,7 @@
             <a:fld id="{E42B43C5-6F52-AD40-A97F-6E8DC5AF1C1A}" type="datetimeFigureOut">
               <a:rPr lang="en-US" smtClean="0"/>
               <a:pPr/>
-              <a:t>1/18/2019</a:t>
+              <a:t>4/4/2019</a:t>
             </a:fld>
             <a:endParaRPr lang="en-US"/>
           </a:p>
@@ -2668,7 +2668,7 @@
               <a:pPr>
                 <a:defRPr/>
               </a:pPr>
-              <a:t>1/18/2019</a:t>
+              <a:t>4/4/2019</a:t>
             </a:fld>
             <a:endParaRPr lang="en-US"/>
           </a:p>
@@ -3145,7 +3145,7 @@
               <a:pPr>
                 <a:defRPr/>
               </a:pPr>
-              <a:t>16</a:t>
+              <a:t>12</a:t>
             </a:fld>
             <a:endParaRPr lang="en-US"/>
           </a:p>
@@ -3977,1419 +3977,6 @@
       </p:grpSpPr>
       <p:sp>
         <p:nvSpPr>
-          <p:cNvPr id="17" name="CaixaDeTexto 16"/>
-          <p:cNvSpPr txBox="1"/>
-          <p:nvPr/>
-        </p:nvSpPr>
-        <p:spPr>
-          <a:xfrm>
-            <a:off x="2571624" y="-16026"/>
-            <a:ext cx="5264322" cy="338554"/>
-          </a:xfrm>
-          <a:prstGeom prst="rect">
-            <a:avLst/>
-          </a:prstGeom>
-          <a:noFill/>
-        </p:spPr>
-        <p:txBody>
-          <a:bodyPr wrap="square" rtlCol="0">
-            <a:spAutoFit/>
-          </a:bodyPr>
-          <a:lstStyle/>
-          <a:p>
-            <a:r>
-              <a:rPr lang="pt-BR" sz="1600" b="1" dirty="0">
-                <a:solidFill>
-                  <a:schemeClr val="tx1">
-                    <a:lumMod val="65000"/>
-                    <a:lumOff val="35000"/>
-                  </a:schemeClr>
-                </a:solidFill>
-              </a:rPr>
-              <a:t>Importância da estrutura organizacional da TI</a:t>
-            </a:r>
-          </a:p>
-        </p:txBody>
-      </p:sp>
-      <p:pic>
-        <p:nvPicPr>
-          <p:cNvPr id="4" name="Picture 3">
-            <a:extLst>
-              <a:ext uri="{FF2B5EF4-FFF2-40B4-BE49-F238E27FC236}">
-                <a16:creationId xmlns:a16="http://schemas.microsoft.com/office/drawing/2014/main" id="{ABCB0B9D-AD6D-4CB4-B01C-08445AA89BCE}"/>
-              </a:ext>
-            </a:extLst>
-          </p:cNvPr>
-          <p:cNvPicPr>
-            <a:picLocks noChangeAspect="1" noChangeArrowheads="1"/>
-          </p:cNvPicPr>
-          <p:nvPr/>
-        </p:nvPicPr>
-        <p:blipFill rotWithShape="1">
-          <a:blip r:embed="rId2">
-            <a:extLst>
-              <a:ext uri="{28A0092B-C50C-407E-A947-70E740481C1C}">
-                <a14:useLocalDpi xmlns:a14="http://schemas.microsoft.com/office/drawing/2010/main" val="0"/>
-              </a:ext>
-            </a:extLst>
-          </a:blip>
-          <a:srcRect l="1660" t="2018" r="1966" b="2416"/>
-          <a:stretch/>
-        </p:blipFill>
-        <p:spPr bwMode="auto">
-          <a:xfrm>
-            <a:off x="2333207" y="322528"/>
-            <a:ext cx="5823296" cy="4550778"/>
-          </a:xfrm>
-          <a:prstGeom prst="rect">
-            <a:avLst/>
-          </a:prstGeom>
-          <a:noFill/>
-          <a:ln>
-            <a:noFill/>
-          </a:ln>
-          <a:extLst>
-            <a:ext uri="{909E8E84-426E-40DD-AFC4-6F175D3DCCD1}">
-              <a14:hiddenFill xmlns:a14="http://schemas.microsoft.com/office/drawing/2010/main">
-                <a:solidFill>
-                  <a:schemeClr val="accent1"/>
-                </a:solidFill>
-              </a14:hiddenFill>
-            </a:ext>
-            <a:ext uri="{91240B29-F687-4F45-9708-019B960494DF}">
-              <a14:hiddenLine xmlns:a14="http://schemas.microsoft.com/office/drawing/2010/main" w="9525">
-                <a:solidFill>
-                  <a:schemeClr val="tx1"/>
-                </a:solidFill>
-                <a:miter lim="800000"/>
-                <a:headEnd/>
-                <a:tailEnd/>
-              </a14:hiddenLine>
-            </a:ext>
-          </a:extLst>
-        </p:spPr>
-      </p:pic>
-      <p:sp>
-        <p:nvSpPr>
-          <p:cNvPr id="5" name="Retângulo 4">
-            <a:extLst>
-              <a:ext uri="{FF2B5EF4-FFF2-40B4-BE49-F238E27FC236}">
-                <a16:creationId xmlns:a16="http://schemas.microsoft.com/office/drawing/2014/main" id="{7EAFE6EF-A115-4154-ABC7-C3264A29432E}"/>
-              </a:ext>
-            </a:extLst>
-          </p:cNvPr>
-          <p:cNvSpPr/>
-          <p:nvPr/>
-        </p:nvSpPr>
-        <p:spPr>
-          <a:xfrm>
-            <a:off x="64513" y="1177591"/>
-            <a:ext cx="2199565" cy="3077766"/>
-          </a:xfrm>
-          <a:prstGeom prst="rect">
-            <a:avLst/>
-          </a:prstGeom>
-        </p:spPr>
-        <p:style>
-          <a:lnRef idx="0">
-            <a:schemeClr val="accent3"/>
-          </a:lnRef>
-          <a:fillRef idx="3">
-            <a:schemeClr val="accent3"/>
-          </a:fillRef>
-          <a:effectRef idx="3">
-            <a:schemeClr val="accent3"/>
-          </a:effectRef>
-          <a:fontRef idx="minor">
-            <a:schemeClr val="lt1"/>
-          </a:fontRef>
-        </p:style>
-        <p:txBody>
-          <a:bodyPr wrap="square">
-            <a:spAutoFit/>
-          </a:bodyPr>
-          <a:lstStyle/>
-          <a:p>
-            <a:pPr>
-              <a:spcAft>
-                <a:spcPts val="1200"/>
-              </a:spcAft>
-              <a:buFont typeface="+mj-lt"/>
-              <a:buAutoNum type="arabicPeriod"/>
-            </a:pPr>
-            <a:r>
-              <a:rPr lang="pt-BR" sz="1600" b="1" dirty="0">
-                <a:solidFill>
-                  <a:schemeClr val="tx1">
-                    <a:lumMod val="65000"/>
-                    <a:lumOff val="35000"/>
-                  </a:schemeClr>
-                </a:solidFill>
-              </a:rPr>
-              <a:t>Especialização do trabalho</a:t>
-            </a:r>
-          </a:p>
-          <a:p>
-            <a:pPr>
-              <a:spcAft>
-                <a:spcPts val="1200"/>
-              </a:spcAft>
-              <a:buFont typeface="+mj-lt"/>
-              <a:buAutoNum type="arabicPeriod"/>
-            </a:pPr>
-            <a:r>
-              <a:rPr lang="pt-BR" sz="1600" b="1" dirty="0">
-                <a:solidFill>
-                  <a:srgbClr val="0066FF"/>
-                </a:solidFill>
-              </a:rPr>
-              <a:t>Departamentalização</a:t>
-            </a:r>
-          </a:p>
-          <a:p>
-            <a:pPr>
-              <a:spcAft>
-                <a:spcPts val="1200"/>
-              </a:spcAft>
-              <a:buFont typeface="+mj-lt"/>
-              <a:buAutoNum type="arabicPeriod"/>
-            </a:pPr>
-            <a:r>
-              <a:rPr lang="pt-BR" sz="1600" b="1" dirty="0">
-                <a:solidFill>
-                  <a:schemeClr val="tx1">
-                    <a:lumMod val="65000"/>
-                    <a:lumOff val="35000"/>
-                  </a:schemeClr>
-                </a:solidFill>
-              </a:rPr>
-              <a:t>Cadeia de comando</a:t>
-            </a:r>
-          </a:p>
-          <a:p>
-            <a:pPr>
-              <a:spcAft>
-                <a:spcPts val="1200"/>
-              </a:spcAft>
-              <a:buFont typeface="+mj-lt"/>
-              <a:buAutoNum type="arabicPeriod"/>
-            </a:pPr>
-            <a:r>
-              <a:rPr lang="pt-BR" sz="1600" b="1" dirty="0">
-                <a:solidFill>
-                  <a:schemeClr val="tx1">
-                    <a:lumMod val="65000"/>
-                    <a:lumOff val="35000"/>
-                  </a:schemeClr>
-                </a:solidFill>
-              </a:rPr>
-              <a:t>Amplitude de controle</a:t>
-            </a:r>
-          </a:p>
-          <a:p>
-            <a:pPr>
-              <a:spcAft>
-                <a:spcPts val="1200"/>
-              </a:spcAft>
-              <a:buFont typeface="+mj-lt"/>
-              <a:buAutoNum type="arabicPeriod"/>
-            </a:pPr>
-            <a:r>
-              <a:rPr lang="pt-BR" sz="1600" b="1" dirty="0">
-                <a:solidFill>
-                  <a:schemeClr val="tx1">
-                    <a:lumMod val="65000"/>
-                    <a:lumOff val="35000"/>
-                  </a:schemeClr>
-                </a:solidFill>
-              </a:rPr>
-              <a:t>Centralização e descentralização</a:t>
-            </a:r>
-          </a:p>
-          <a:p>
-            <a:pPr>
-              <a:spcAft>
-                <a:spcPts val="1200"/>
-              </a:spcAft>
-              <a:buFont typeface="+mj-lt"/>
-              <a:buAutoNum type="arabicPeriod"/>
-            </a:pPr>
-            <a:r>
-              <a:rPr lang="pt-BR" sz="1600" b="1" dirty="0">
-                <a:solidFill>
-                  <a:schemeClr val="tx1">
-                    <a:lumMod val="65000"/>
-                    <a:lumOff val="35000"/>
-                  </a:schemeClr>
-                </a:solidFill>
-              </a:rPr>
-              <a:t>Formalização</a:t>
-            </a:r>
-          </a:p>
-        </p:txBody>
-      </p:sp>
-    </p:spTree>
-    <p:extLst>
-      <p:ext uri="{BB962C8B-B14F-4D97-AF65-F5344CB8AC3E}">
-        <p14:creationId xmlns:p14="http://schemas.microsoft.com/office/powerpoint/2010/main" val="2352844542"/>
-      </p:ext>
-    </p:extLst>
-  </p:cSld>
-  <p:clrMapOvr>
-    <a:masterClrMapping/>
-  </p:clrMapOvr>
-</p:sld>
-</file>
-
-<file path=ppt/slides/slide11.xml><?xml version="1.0" encoding="utf-8"?>
-<p:sld xmlns:a="http://schemas.openxmlformats.org/drawingml/2006/main" xmlns:r="http://schemas.openxmlformats.org/officeDocument/2006/relationships" xmlns:p="http://schemas.openxmlformats.org/presentationml/2006/main">
-  <p:cSld>
-    <p:spTree>
-      <p:nvGrpSpPr>
-        <p:cNvPr id="1" name=""/>
-        <p:cNvGrpSpPr/>
-        <p:nvPr/>
-      </p:nvGrpSpPr>
-      <p:grpSpPr>
-        <a:xfrm>
-          <a:off x="0" y="0"/>
-          <a:ext cx="0" cy="0"/>
-          <a:chOff x="0" y="0"/>
-          <a:chExt cx="0" cy="0"/>
-        </a:xfrm>
-      </p:grpSpPr>
-      <p:sp>
-        <p:nvSpPr>
-          <p:cNvPr id="17" name="CaixaDeTexto 16"/>
-          <p:cNvSpPr txBox="1"/>
-          <p:nvPr/>
-        </p:nvSpPr>
-        <p:spPr>
-          <a:xfrm>
-            <a:off x="2571624" y="-16026"/>
-            <a:ext cx="5264322" cy="338554"/>
-          </a:xfrm>
-          <a:prstGeom prst="rect">
-            <a:avLst/>
-          </a:prstGeom>
-          <a:noFill/>
-        </p:spPr>
-        <p:txBody>
-          <a:bodyPr wrap="square" rtlCol="0">
-            <a:spAutoFit/>
-          </a:bodyPr>
-          <a:lstStyle/>
-          <a:p>
-            <a:r>
-              <a:rPr lang="pt-BR" sz="1600" b="1" dirty="0">
-                <a:solidFill>
-                  <a:schemeClr val="tx1">
-                    <a:lumMod val="65000"/>
-                    <a:lumOff val="35000"/>
-                  </a:schemeClr>
-                </a:solidFill>
-              </a:rPr>
-              <a:t>Importância da estrutura organizacional da TI</a:t>
-            </a:r>
-          </a:p>
-        </p:txBody>
-      </p:sp>
-      <p:pic>
-        <p:nvPicPr>
-          <p:cNvPr id="4" name="Picture 3">
-            <a:extLst>
-              <a:ext uri="{FF2B5EF4-FFF2-40B4-BE49-F238E27FC236}">
-                <a16:creationId xmlns:a16="http://schemas.microsoft.com/office/drawing/2014/main" id="{9ACDD883-8D8F-4E13-A6F0-D0312E3CFB1D}"/>
-              </a:ext>
-            </a:extLst>
-          </p:cNvPr>
-          <p:cNvPicPr>
-            <a:picLocks noChangeAspect="1" noChangeArrowheads="1"/>
-          </p:cNvPicPr>
-          <p:nvPr/>
-        </p:nvPicPr>
-        <p:blipFill rotWithShape="1">
-          <a:blip r:embed="rId2">
-            <a:extLst>
-              <a:ext uri="{28A0092B-C50C-407E-A947-70E740481C1C}">
-                <a14:useLocalDpi xmlns:a14="http://schemas.microsoft.com/office/drawing/2010/main" val="0"/>
-              </a:ext>
-            </a:extLst>
-          </a:blip>
-          <a:srcRect l="1508" t="1903" r="1359" b="2908"/>
-          <a:stretch/>
-        </p:blipFill>
-        <p:spPr bwMode="auto">
-          <a:xfrm>
-            <a:off x="2283725" y="277503"/>
-            <a:ext cx="5919521" cy="4676633"/>
-          </a:xfrm>
-          <a:prstGeom prst="rect">
-            <a:avLst/>
-          </a:prstGeom>
-          <a:noFill/>
-          <a:ln>
-            <a:noFill/>
-          </a:ln>
-          <a:extLst>
-            <a:ext uri="{909E8E84-426E-40DD-AFC4-6F175D3DCCD1}">
-              <a14:hiddenFill xmlns:a14="http://schemas.microsoft.com/office/drawing/2010/main">
-                <a:solidFill>
-                  <a:schemeClr val="accent1"/>
-                </a:solidFill>
-              </a14:hiddenFill>
-            </a:ext>
-            <a:ext uri="{91240B29-F687-4F45-9708-019B960494DF}">
-              <a14:hiddenLine xmlns:a14="http://schemas.microsoft.com/office/drawing/2010/main" w="9525">
-                <a:solidFill>
-                  <a:schemeClr val="tx1"/>
-                </a:solidFill>
-                <a:miter lim="800000"/>
-                <a:headEnd/>
-                <a:tailEnd/>
-              </a14:hiddenLine>
-            </a:ext>
-          </a:extLst>
-        </p:spPr>
-      </p:pic>
-      <p:sp>
-        <p:nvSpPr>
-          <p:cNvPr id="5" name="Retângulo 4">
-            <a:extLst>
-              <a:ext uri="{FF2B5EF4-FFF2-40B4-BE49-F238E27FC236}">
-                <a16:creationId xmlns:a16="http://schemas.microsoft.com/office/drawing/2014/main" id="{AF23D369-0E91-4613-BAD4-BA83ABBBC28B}"/>
-              </a:ext>
-            </a:extLst>
-          </p:cNvPr>
-          <p:cNvSpPr/>
-          <p:nvPr/>
-        </p:nvSpPr>
-        <p:spPr>
-          <a:xfrm>
-            <a:off x="64513" y="1177591"/>
-            <a:ext cx="2199565" cy="3077766"/>
-          </a:xfrm>
-          <a:prstGeom prst="rect">
-            <a:avLst/>
-          </a:prstGeom>
-        </p:spPr>
-        <p:style>
-          <a:lnRef idx="0">
-            <a:schemeClr val="accent3"/>
-          </a:lnRef>
-          <a:fillRef idx="3">
-            <a:schemeClr val="accent3"/>
-          </a:fillRef>
-          <a:effectRef idx="3">
-            <a:schemeClr val="accent3"/>
-          </a:effectRef>
-          <a:fontRef idx="minor">
-            <a:schemeClr val="lt1"/>
-          </a:fontRef>
-        </p:style>
-        <p:txBody>
-          <a:bodyPr wrap="square">
-            <a:spAutoFit/>
-          </a:bodyPr>
-          <a:lstStyle/>
-          <a:p>
-            <a:pPr>
-              <a:spcAft>
-                <a:spcPts val="1200"/>
-              </a:spcAft>
-              <a:buFont typeface="+mj-lt"/>
-              <a:buAutoNum type="arabicPeriod"/>
-            </a:pPr>
-            <a:r>
-              <a:rPr lang="pt-BR" sz="1600" b="1" dirty="0">
-                <a:solidFill>
-                  <a:schemeClr val="tx1">
-                    <a:lumMod val="65000"/>
-                    <a:lumOff val="35000"/>
-                  </a:schemeClr>
-                </a:solidFill>
-              </a:rPr>
-              <a:t>Especialização do trabalho</a:t>
-            </a:r>
-          </a:p>
-          <a:p>
-            <a:pPr>
-              <a:spcAft>
-                <a:spcPts val="1200"/>
-              </a:spcAft>
-              <a:buFont typeface="+mj-lt"/>
-              <a:buAutoNum type="arabicPeriod"/>
-            </a:pPr>
-            <a:r>
-              <a:rPr lang="pt-BR" sz="1600" b="1" dirty="0">
-                <a:solidFill>
-                  <a:schemeClr val="tx1">
-                    <a:lumMod val="65000"/>
-                    <a:lumOff val="35000"/>
-                  </a:schemeClr>
-                </a:solidFill>
-              </a:rPr>
-              <a:t>Departamentalização</a:t>
-            </a:r>
-          </a:p>
-          <a:p>
-            <a:pPr>
-              <a:spcAft>
-                <a:spcPts val="1200"/>
-              </a:spcAft>
-              <a:buFont typeface="+mj-lt"/>
-              <a:buAutoNum type="arabicPeriod"/>
-            </a:pPr>
-            <a:r>
-              <a:rPr lang="pt-BR" sz="1600" b="1" dirty="0">
-                <a:solidFill>
-                  <a:srgbClr val="0066FF"/>
-                </a:solidFill>
-              </a:rPr>
-              <a:t>Cadeia de comando</a:t>
-            </a:r>
-          </a:p>
-          <a:p>
-            <a:pPr>
-              <a:spcAft>
-                <a:spcPts val="1200"/>
-              </a:spcAft>
-              <a:buFont typeface="+mj-lt"/>
-              <a:buAutoNum type="arabicPeriod"/>
-            </a:pPr>
-            <a:r>
-              <a:rPr lang="pt-BR" sz="1600" b="1" dirty="0">
-                <a:solidFill>
-                  <a:schemeClr val="tx1">
-                    <a:lumMod val="65000"/>
-                    <a:lumOff val="35000"/>
-                  </a:schemeClr>
-                </a:solidFill>
-              </a:rPr>
-              <a:t>Amplitude de controle</a:t>
-            </a:r>
-          </a:p>
-          <a:p>
-            <a:pPr>
-              <a:spcAft>
-                <a:spcPts val="1200"/>
-              </a:spcAft>
-              <a:buFont typeface="+mj-lt"/>
-              <a:buAutoNum type="arabicPeriod"/>
-            </a:pPr>
-            <a:r>
-              <a:rPr lang="pt-BR" sz="1600" b="1" dirty="0">
-                <a:solidFill>
-                  <a:schemeClr val="tx1">
-                    <a:lumMod val="65000"/>
-                    <a:lumOff val="35000"/>
-                  </a:schemeClr>
-                </a:solidFill>
-              </a:rPr>
-              <a:t>Centralização e descentralização</a:t>
-            </a:r>
-          </a:p>
-          <a:p>
-            <a:pPr>
-              <a:spcAft>
-                <a:spcPts val="1200"/>
-              </a:spcAft>
-              <a:buFont typeface="+mj-lt"/>
-              <a:buAutoNum type="arabicPeriod"/>
-            </a:pPr>
-            <a:r>
-              <a:rPr lang="pt-BR" sz="1600" b="1" dirty="0">
-                <a:solidFill>
-                  <a:schemeClr val="tx1">
-                    <a:lumMod val="65000"/>
-                    <a:lumOff val="35000"/>
-                  </a:schemeClr>
-                </a:solidFill>
-              </a:rPr>
-              <a:t>Formalização</a:t>
-            </a:r>
-          </a:p>
-        </p:txBody>
-      </p:sp>
-    </p:spTree>
-    <p:extLst>
-      <p:ext uri="{BB962C8B-B14F-4D97-AF65-F5344CB8AC3E}">
-        <p14:creationId xmlns:p14="http://schemas.microsoft.com/office/powerpoint/2010/main" val="3371471048"/>
-      </p:ext>
-    </p:extLst>
-  </p:cSld>
-  <p:clrMapOvr>
-    <a:masterClrMapping/>
-  </p:clrMapOvr>
-</p:sld>
-</file>
-
-<file path=ppt/slides/slide12.xml><?xml version="1.0" encoding="utf-8"?>
-<p:sld xmlns:a="http://schemas.openxmlformats.org/drawingml/2006/main" xmlns:r="http://schemas.openxmlformats.org/officeDocument/2006/relationships" xmlns:p="http://schemas.openxmlformats.org/presentationml/2006/main">
-  <p:cSld>
-    <p:spTree>
-      <p:nvGrpSpPr>
-        <p:cNvPr id="1" name=""/>
-        <p:cNvGrpSpPr/>
-        <p:nvPr/>
-      </p:nvGrpSpPr>
-      <p:grpSpPr>
-        <a:xfrm>
-          <a:off x="0" y="0"/>
-          <a:ext cx="0" cy="0"/>
-          <a:chOff x="0" y="0"/>
-          <a:chExt cx="0" cy="0"/>
-        </a:xfrm>
-      </p:grpSpPr>
-      <p:sp>
-        <p:nvSpPr>
-          <p:cNvPr id="17" name="CaixaDeTexto 16"/>
-          <p:cNvSpPr txBox="1"/>
-          <p:nvPr/>
-        </p:nvSpPr>
-        <p:spPr>
-          <a:xfrm>
-            <a:off x="2571624" y="-16026"/>
-            <a:ext cx="5264322" cy="338554"/>
-          </a:xfrm>
-          <a:prstGeom prst="rect">
-            <a:avLst/>
-          </a:prstGeom>
-          <a:noFill/>
-        </p:spPr>
-        <p:txBody>
-          <a:bodyPr wrap="square" rtlCol="0">
-            <a:spAutoFit/>
-          </a:bodyPr>
-          <a:lstStyle/>
-          <a:p>
-            <a:r>
-              <a:rPr lang="pt-BR" sz="1600" b="1" dirty="0">
-                <a:solidFill>
-                  <a:schemeClr val="tx1">
-                    <a:lumMod val="65000"/>
-                    <a:lumOff val="35000"/>
-                  </a:schemeClr>
-                </a:solidFill>
-              </a:rPr>
-              <a:t>Importância da estrutura organizacional da TI</a:t>
-            </a:r>
-          </a:p>
-        </p:txBody>
-      </p:sp>
-      <p:pic>
-        <p:nvPicPr>
-          <p:cNvPr id="4" name="Picture 5">
-            <a:extLst>
-              <a:ext uri="{FF2B5EF4-FFF2-40B4-BE49-F238E27FC236}">
-                <a16:creationId xmlns:a16="http://schemas.microsoft.com/office/drawing/2014/main" id="{FFF51428-E4E3-49E0-A2BD-79FDE803A7F7}"/>
-              </a:ext>
-            </a:extLst>
-          </p:cNvPr>
-          <p:cNvPicPr>
-            <a:picLocks noChangeAspect="1" noChangeArrowheads="1"/>
-          </p:cNvPicPr>
-          <p:nvPr/>
-        </p:nvPicPr>
-        <p:blipFill rotWithShape="1">
-          <a:blip r:embed="rId2">
-            <a:extLst>
-              <a:ext uri="{28A0092B-C50C-407E-A947-70E740481C1C}">
-                <a14:useLocalDpi xmlns:a14="http://schemas.microsoft.com/office/drawing/2010/main" val="0"/>
-              </a:ext>
-            </a:extLst>
-          </a:blip>
-          <a:srcRect l="1596" t="2680" r="1629" b="3463"/>
-          <a:stretch/>
-        </p:blipFill>
-        <p:spPr bwMode="auto">
-          <a:xfrm>
-            <a:off x="2260417" y="263909"/>
-            <a:ext cx="5900944" cy="4615682"/>
-          </a:xfrm>
-          <a:prstGeom prst="rect">
-            <a:avLst/>
-          </a:prstGeom>
-          <a:noFill/>
-          <a:ln>
-            <a:noFill/>
-          </a:ln>
-          <a:extLst>
-            <a:ext uri="{909E8E84-426E-40DD-AFC4-6F175D3DCCD1}">
-              <a14:hiddenFill xmlns:a14="http://schemas.microsoft.com/office/drawing/2010/main">
-                <a:solidFill>
-                  <a:schemeClr val="accent1"/>
-                </a:solidFill>
-              </a14:hiddenFill>
-            </a:ext>
-            <a:ext uri="{91240B29-F687-4F45-9708-019B960494DF}">
-              <a14:hiddenLine xmlns:a14="http://schemas.microsoft.com/office/drawing/2010/main" w="9525">
-                <a:solidFill>
-                  <a:schemeClr val="tx1"/>
-                </a:solidFill>
-                <a:miter lim="800000"/>
-                <a:headEnd/>
-                <a:tailEnd/>
-              </a14:hiddenLine>
-            </a:ext>
-          </a:extLst>
-        </p:spPr>
-      </p:pic>
-      <p:sp>
-        <p:nvSpPr>
-          <p:cNvPr id="5" name="Retângulo 4">
-            <a:extLst>
-              <a:ext uri="{FF2B5EF4-FFF2-40B4-BE49-F238E27FC236}">
-                <a16:creationId xmlns:a16="http://schemas.microsoft.com/office/drawing/2014/main" id="{DB105AE0-055A-4EA3-AB17-6DFE02F9C17F}"/>
-              </a:ext>
-            </a:extLst>
-          </p:cNvPr>
-          <p:cNvSpPr/>
-          <p:nvPr/>
-        </p:nvSpPr>
-        <p:spPr>
-          <a:xfrm>
-            <a:off x="64513" y="1177591"/>
-            <a:ext cx="2199565" cy="3077766"/>
-          </a:xfrm>
-          <a:prstGeom prst="rect">
-            <a:avLst/>
-          </a:prstGeom>
-        </p:spPr>
-        <p:style>
-          <a:lnRef idx="0">
-            <a:schemeClr val="accent3"/>
-          </a:lnRef>
-          <a:fillRef idx="3">
-            <a:schemeClr val="accent3"/>
-          </a:fillRef>
-          <a:effectRef idx="3">
-            <a:schemeClr val="accent3"/>
-          </a:effectRef>
-          <a:fontRef idx="minor">
-            <a:schemeClr val="lt1"/>
-          </a:fontRef>
-        </p:style>
-        <p:txBody>
-          <a:bodyPr wrap="square">
-            <a:spAutoFit/>
-          </a:bodyPr>
-          <a:lstStyle/>
-          <a:p>
-            <a:pPr>
-              <a:spcAft>
-                <a:spcPts val="1200"/>
-              </a:spcAft>
-              <a:buFont typeface="+mj-lt"/>
-              <a:buAutoNum type="arabicPeriod"/>
-            </a:pPr>
-            <a:r>
-              <a:rPr lang="pt-BR" sz="1600" b="1" dirty="0">
-                <a:solidFill>
-                  <a:schemeClr val="tx1">
-                    <a:lumMod val="65000"/>
-                    <a:lumOff val="35000"/>
-                  </a:schemeClr>
-                </a:solidFill>
-              </a:rPr>
-              <a:t>Especialização do trabalho</a:t>
-            </a:r>
-          </a:p>
-          <a:p>
-            <a:pPr>
-              <a:spcAft>
-                <a:spcPts val="1200"/>
-              </a:spcAft>
-              <a:buFont typeface="+mj-lt"/>
-              <a:buAutoNum type="arabicPeriod"/>
-            </a:pPr>
-            <a:r>
-              <a:rPr lang="pt-BR" sz="1600" b="1" dirty="0">
-                <a:solidFill>
-                  <a:schemeClr val="tx1">
-                    <a:lumMod val="65000"/>
-                    <a:lumOff val="35000"/>
-                  </a:schemeClr>
-                </a:solidFill>
-              </a:rPr>
-              <a:t>Departamentalização</a:t>
-            </a:r>
-          </a:p>
-          <a:p>
-            <a:pPr>
-              <a:spcAft>
-                <a:spcPts val="1200"/>
-              </a:spcAft>
-              <a:buFont typeface="+mj-lt"/>
-              <a:buAutoNum type="arabicPeriod"/>
-            </a:pPr>
-            <a:r>
-              <a:rPr lang="pt-BR" sz="1600" b="1" dirty="0">
-                <a:solidFill>
-                  <a:schemeClr val="tx1">
-                    <a:lumMod val="65000"/>
-                    <a:lumOff val="35000"/>
-                  </a:schemeClr>
-                </a:solidFill>
-              </a:rPr>
-              <a:t>Cadeia de comando</a:t>
-            </a:r>
-          </a:p>
-          <a:p>
-            <a:pPr>
-              <a:spcAft>
-                <a:spcPts val="1200"/>
-              </a:spcAft>
-              <a:buFont typeface="+mj-lt"/>
-              <a:buAutoNum type="arabicPeriod"/>
-            </a:pPr>
-            <a:r>
-              <a:rPr lang="pt-BR" sz="1600" b="1" dirty="0">
-                <a:solidFill>
-                  <a:srgbClr val="0066FF"/>
-                </a:solidFill>
-              </a:rPr>
-              <a:t>Amplitude de controle</a:t>
-            </a:r>
-          </a:p>
-          <a:p>
-            <a:pPr>
-              <a:spcAft>
-                <a:spcPts val="1200"/>
-              </a:spcAft>
-              <a:buFont typeface="+mj-lt"/>
-              <a:buAutoNum type="arabicPeriod"/>
-            </a:pPr>
-            <a:r>
-              <a:rPr lang="pt-BR" sz="1600" b="1" dirty="0">
-                <a:solidFill>
-                  <a:schemeClr val="tx1">
-                    <a:lumMod val="65000"/>
-                    <a:lumOff val="35000"/>
-                  </a:schemeClr>
-                </a:solidFill>
-              </a:rPr>
-              <a:t>Centralização e descentralização</a:t>
-            </a:r>
-          </a:p>
-          <a:p>
-            <a:pPr>
-              <a:spcAft>
-                <a:spcPts val="1200"/>
-              </a:spcAft>
-              <a:buFont typeface="+mj-lt"/>
-              <a:buAutoNum type="arabicPeriod"/>
-            </a:pPr>
-            <a:r>
-              <a:rPr lang="pt-BR" sz="1600" b="1" dirty="0">
-                <a:solidFill>
-                  <a:schemeClr val="tx1">
-                    <a:lumMod val="65000"/>
-                    <a:lumOff val="35000"/>
-                  </a:schemeClr>
-                </a:solidFill>
-              </a:rPr>
-              <a:t>Formalização</a:t>
-            </a:r>
-          </a:p>
-        </p:txBody>
-      </p:sp>
-    </p:spTree>
-    <p:extLst>
-      <p:ext uri="{BB962C8B-B14F-4D97-AF65-F5344CB8AC3E}">
-        <p14:creationId xmlns:p14="http://schemas.microsoft.com/office/powerpoint/2010/main" val="1684320631"/>
-      </p:ext>
-    </p:extLst>
-  </p:cSld>
-  <p:clrMapOvr>
-    <a:masterClrMapping/>
-  </p:clrMapOvr>
-</p:sld>
-</file>
-
-<file path=ppt/slides/slide13.xml><?xml version="1.0" encoding="utf-8"?>
-<p:sld xmlns:a="http://schemas.openxmlformats.org/drawingml/2006/main" xmlns:r="http://schemas.openxmlformats.org/officeDocument/2006/relationships" xmlns:p="http://schemas.openxmlformats.org/presentationml/2006/main">
-  <p:cSld>
-    <p:spTree>
-      <p:nvGrpSpPr>
-        <p:cNvPr id="1" name=""/>
-        <p:cNvGrpSpPr/>
-        <p:nvPr/>
-      </p:nvGrpSpPr>
-      <p:grpSpPr>
-        <a:xfrm>
-          <a:off x="0" y="0"/>
-          <a:ext cx="0" cy="0"/>
-          <a:chOff x="0" y="0"/>
-          <a:chExt cx="0" cy="0"/>
-        </a:xfrm>
-      </p:grpSpPr>
-      <p:sp>
-        <p:nvSpPr>
-          <p:cNvPr id="17" name="CaixaDeTexto 16"/>
-          <p:cNvSpPr txBox="1"/>
-          <p:nvPr/>
-        </p:nvSpPr>
-        <p:spPr>
-          <a:xfrm>
-            <a:off x="2571624" y="-16026"/>
-            <a:ext cx="5264322" cy="338554"/>
-          </a:xfrm>
-          <a:prstGeom prst="rect">
-            <a:avLst/>
-          </a:prstGeom>
-          <a:noFill/>
-        </p:spPr>
-        <p:txBody>
-          <a:bodyPr wrap="square" rtlCol="0">
-            <a:spAutoFit/>
-          </a:bodyPr>
-          <a:lstStyle/>
-          <a:p>
-            <a:r>
-              <a:rPr lang="pt-BR" sz="1600" b="1" dirty="0">
-                <a:solidFill>
-                  <a:schemeClr val="tx1">
-                    <a:lumMod val="65000"/>
-                    <a:lumOff val="35000"/>
-                  </a:schemeClr>
-                </a:solidFill>
-              </a:rPr>
-              <a:t>Importância da estrutura organizacional da TI</a:t>
-            </a:r>
-          </a:p>
-        </p:txBody>
-      </p:sp>
-      <p:pic>
-        <p:nvPicPr>
-          <p:cNvPr id="4" name="Picture 5">
-            <a:extLst>
-              <a:ext uri="{FF2B5EF4-FFF2-40B4-BE49-F238E27FC236}">
-                <a16:creationId xmlns:a16="http://schemas.microsoft.com/office/drawing/2014/main" id="{30D8F874-48A8-4C91-9D68-F2D9C00E2A15}"/>
-              </a:ext>
-            </a:extLst>
-          </p:cNvPr>
-          <p:cNvPicPr>
-            <a:picLocks noChangeAspect="1" noChangeArrowheads="1"/>
-          </p:cNvPicPr>
-          <p:nvPr/>
-        </p:nvPicPr>
-        <p:blipFill>
-          <a:blip r:embed="rId2">
-            <a:extLst>
-              <a:ext uri="{28A0092B-C50C-407E-A947-70E740481C1C}">
-                <a14:useLocalDpi xmlns:a14="http://schemas.microsoft.com/office/drawing/2010/main" val="0"/>
-              </a:ext>
-            </a:extLst>
-          </a:blip>
-          <a:srcRect/>
-          <a:stretch>
-            <a:fillRect/>
-          </a:stretch>
-        </p:blipFill>
-        <p:spPr bwMode="auto">
-          <a:xfrm>
-            <a:off x="2261848" y="268835"/>
-            <a:ext cx="5872217" cy="4700376"/>
-          </a:xfrm>
-          <a:prstGeom prst="rect">
-            <a:avLst/>
-          </a:prstGeom>
-          <a:noFill/>
-          <a:ln>
-            <a:noFill/>
-          </a:ln>
-          <a:extLst>
-            <a:ext uri="{909E8E84-426E-40DD-AFC4-6F175D3DCCD1}">
-              <a14:hiddenFill xmlns:a14="http://schemas.microsoft.com/office/drawing/2010/main">
-                <a:solidFill>
-                  <a:schemeClr val="accent1"/>
-                </a:solidFill>
-              </a14:hiddenFill>
-            </a:ext>
-            <a:ext uri="{91240B29-F687-4F45-9708-019B960494DF}">
-              <a14:hiddenLine xmlns:a14="http://schemas.microsoft.com/office/drawing/2010/main" w="9525">
-                <a:solidFill>
-                  <a:schemeClr val="tx1"/>
-                </a:solidFill>
-                <a:miter lim="800000"/>
-                <a:headEnd/>
-                <a:tailEnd/>
-              </a14:hiddenLine>
-            </a:ext>
-          </a:extLst>
-        </p:spPr>
-      </p:pic>
-      <p:sp>
-        <p:nvSpPr>
-          <p:cNvPr id="5" name="Retângulo 4">
-            <a:extLst>
-              <a:ext uri="{FF2B5EF4-FFF2-40B4-BE49-F238E27FC236}">
-                <a16:creationId xmlns:a16="http://schemas.microsoft.com/office/drawing/2014/main" id="{AFC855F2-A8BC-420B-B2FB-6C4567B25F2C}"/>
-              </a:ext>
-            </a:extLst>
-          </p:cNvPr>
-          <p:cNvSpPr/>
-          <p:nvPr/>
-        </p:nvSpPr>
-        <p:spPr>
-          <a:xfrm>
-            <a:off x="64513" y="1177591"/>
-            <a:ext cx="2199565" cy="3077766"/>
-          </a:xfrm>
-          <a:prstGeom prst="rect">
-            <a:avLst/>
-          </a:prstGeom>
-        </p:spPr>
-        <p:style>
-          <a:lnRef idx="0">
-            <a:schemeClr val="accent3"/>
-          </a:lnRef>
-          <a:fillRef idx="3">
-            <a:schemeClr val="accent3"/>
-          </a:fillRef>
-          <a:effectRef idx="3">
-            <a:schemeClr val="accent3"/>
-          </a:effectRef>
-          <a:fontRef idx="minor">
-            <a:schemeClr val="lt1"/>
-          </a:fontRef>
-        </p:style>
-        <p:txBody>
-          <a:bodyPr wrap="square">
-            <a:spAutoFit/>
-          </a:bodyPr>
-          <a:lstStyle/>
-          <a:p>
-            <a:pPr>
-              <a:spcAft>
-                <a:spcPts val="1200"/>
-              </a:spcAft>
-              <a:buFont typeface="+mj-lt"/>
-              <a:buAutoNum type="arabicPeriod"/>
-            </a:pPr>
-            <a:r>
-              <a:rPr lang="pt-BR" sz="1600" b="1" dirty="0">
-                <a:solidFill>
-                  <a:schemeClr val="tx1">
-                    <a:lumMod val="65000"/>
-                    <a:lumOff val="35000"/>
-                  </a:schemeClr>
-                </a:solidFill>
-              </a:rPr>
-              <a:t>Especialização do trabalho</a:t>
-            </a:r>
-          </a:p>
-          <a:p>
-            <a:pPr>
-              <a:spcAft>
-                <a:spcPts val="1200"/>
-              </a:spcAft>
-              <a:buFont typeface="+mj-lt"/>
-              <a:buAutoNum type="arabicPeriod"/>
-            </a:pPr>
-            <a:r>
-              <a:rPr lang="pt-BR" sz="1600" b="1" dirty="0">
-                <a:solidFill>
-                  <a:schemeClr val="tx1">
-                    <a:lumMod val="65000"/>
-                    <a:lumOff val="35000"/>
-                  </a:schemeClr>
-                </a:solidFill>
-              </a:rPr>
-              <a:t>Departamentalização</a:t>
-            </a:r>
-          </a:p>
-          <a:p>
-            <a:pPr>
-              <a:spcAft>
-                <a:spcPts val="1200"/>
-              </a:spcAft>
-              <a:buFont typeface="+mj-lt"/>
-              <a:buAutoNum type="arabicPeriod"/>
-            </a:pPr>
-            <a:r>
-              <a:rPr lang="pt-BR" sz="1600" b="1" dirty="0">
-                <a:solidFill>
-                  <a:schemeClr val="tx1">
-                    <a:lumMod val="65000"/>
-                    <a:lumOff val="35000"/>
-                  </a:schemeClr>
-                </a:solidFill>
-              </a:rPr>
-              <a:t>Cadeia de comando</a:t>
-            </a:r>
-          </a:p>
-          <a:p>
-            <a:pPr>
-              <a:spcAft>
-                <a:spcPts val="1200"/>
-              </a:spcAft>
-              <a:buFont typeface="+mj-lt"/>
-              <a:buAutoNum type="arabicPeriod"/>
-            </a:pPr>
-            <a:r>
-              <a:rPr lang="pt-BR" sz="1600" b="1" dirty="0">
-                <a:solidFill>
-                  <a:schemeClr val="tx1">
-                    <a:lumMod val="65000"/>
-                    <a:lumOff val="35000"/>
-                  </a:schemeClr>
-                </a:solidFill>
-              </a:rPr>
-              <a:t>Amplitude de controle</a:t>
-            </a:r>
-          </a:p>
-          <a:p>
-            <a:pPr>
-              <a:spcAft>
-                <a:spcPts val="1200"/>
-              </a:spcAft>
-              <a:buFont typeface="+mj-lt"/>
-              <a:buAutoNum type="arabicPeriod"/>
-            </a:pPr>
-            <a:r>
-              <a:rPr lang="pt-BR" sz="1600" b="1" dirty="0">
-                <a:solidFill>
-                  <a:srgbClr val="0066FF"/>
-                </a:solidFill>
-              </a:rPr>
-              <a:t>Centralização e descentralização</a:t>
-            </a:r>
-          </a:p>
-          <a:p>
-            <a:pPr>
-              <a:spcAft>
-                <a:spcPts val="1200"/>
-              </a:spcAft>
-              <a:buFont typeface="+mj-lt"/>
-              <a:buAutoNum type="arabicPeriod"/>
-            </a:pPr>
-            <a:r>
-              <a:rPr lang="pt-BR" sz="1600" b="1" dirty="0">
-                <a:solidFill>
-                  <a:schemeClr val="tx1">
-                    <a:lumMod val="65000"/>
-                    <a:lumOff val="35000"/>
-                  </a:schemeClr>
-                </a:solidFill>
-              </a:rPr>
-              <a:t>Formalização</a:t>
-            </a:r>
-          </a:p>
-        </p:txBody>
-      </p:sp>
-    </p:spTree>
-    <p:extLst>
-      <p:ext uri="{BB962C8B-B14F-4D97-AF65-F5344CB8AC3E}">
-        <p14:creationId xmlns:p14="http://schemas.microsoft.com/office/powerpoint/2010/main" val="2661064859"/>
-      </p:ext>
-    </p:extLst>
-  </p:cSld>
-  <p:clrMapOvr>
-    <a:masterClrMapping/>
-  </p:clrMapOvr>
-</p:sld>
-</file>
-
-<file path=ppt/slides/slide14.xml><?xml version="1.0" encoding="utf-8"?>
-<p:sld xmlns:a="http://schemas.openxmlformats.org/drawingml/2006/main" xmlns:r="http://schemas.openxmlformats.org/officeDocument/2006/relationships" xmlns:p="http://schemas.openxmlformats.org/presentationml/2006/main">
-  <p:cSld>
-    <p:spTree>
-      <p:nvGrpSpPr>
-        <p:cNvPr id="1" name=""/>
-        <p:cNvGrpSpPr/>
-        <p:nvPr/>
-      </p:nvGrpSpPr>
-      <p:grpSpPr>
-        <a:xfrm>
-          <a:off x="0" y="0"/>
-          <a:ext cx="0" cy="0"/>
-          <a:chOff x="0" y="0"/>
-          <a:chExt cx="0" cy="0"/>
-        </a:xfrm>
-      </p:grpSpPr>
-      <p:pic>
-        <p:nvPicPr>
-          <p:cNvPr id="16" name="Picture 2"/>
-          <p:cNvPicPr>
-            <a:picLocks noChangeAspect="1" noChangeArrowheads="1"/>
-          </p:cNvPicPr>
-          <p:nvPr/>
-        </p:nvPicPr>
-        <p:blipFill>
-          <a:blip r:embed="rId2">
-            <a:extLst>
-              <a:ext uri="{28A0092B-C50C-407E-A947-70E740481C1C}">
-                <a14:useLocalDpi xmlns:a14="http://schemas.microsoft.com/office/drawing/2010/main" val="0"/>
-              </a:ext>
-            </a:extLst>
-          </a:blip>
-          <a:srcRect/>
-          <a:stretch>
-            <a:fillRect/>
-          </a:stretch>
-        </p:blipFill>
-        <p:spPr bwMode="auto">
-          <a:xfrm>
-            <a:off x="2268894" y="189504"/>
-            <a:ext cx="5958897" cy="4764492"/>
-          </a:xfrm>
-          <a:prstGeom prst="rect">
-            <a:avLst/>
-          </a:prstGeom>
-          <a:noFill/>
-          <a:ln>
-            <a:noFill/>
-          </a:ln>
-          <a:extLst>
-            <a:ext uri="{909E8E84-426E-40DD-AFC4-6F175D3DCCD1}">
-              <a14:hiddenFill xmlns:a14="http://schemas.microsoft.com/office/drawing/2010/main">
-                <a:solidFill>
-                  <a:schemeClr val="accent1"/>
-                </a:solidFill>
-              </a14:hiddenFill>
-            </a:ext>
-            <a:ext uri="{91240B29-F687-4F45-9708-019B960494DF}">
-              <a14:hiddenLine xmlns:a14="http://schemas.microsoft.com/office/drawing/2010/main" w="9525">
-                <a:solidFill>
-                  <a:schemeClr val="tx1"/>
-                </a:solidFill>
-                <a:miter lim="800000"/>
-                <a:headEnd/>
-                <a:tailEnd/>
-              </a14:hiddenLine>
-            </a:ext>
-          </a:extLst>
-        </p:spPr>
-      </p:pic>
-      <p:sp>
-        <p:nvSpPr>
-          <p:cNvPr id="17" name="CaixaDeTexto 16"/>
-          <p:cNvSpPr txBox="1"/>
-          <p:nvPr/>
-        </p:nvSpPr>
-        <p:spPr>
-          <a:xfrm>
-            <a:off x="2571624" y="-16026"/>
-            <a:ext cx="5264322" cy="338554"/>
-          </a:xfrm>
-          <a:prstGeom prst="rect">
-            <a:avLst/>
-          </a:prstGeom>
-          <a:noFill/>
-        </p:spPr>
-        <p:txBody>
-          <a:bodyPr wrap="square" rtlCol="0">
-            <a:spAutoFit/>
-          </a:bodyPr>
-          <a:lstStyle/>
-          <a:p>
-            <a:r>
-              <a:rPr lang="pt-BR" sz="1600" b="1" dirty="0">
-                <a:solidFill>
-                  <a:schemeClr val="tx1">
-                    <a:lumMod val="65000"/>
-                    <a:lumOff val="35000"/>
-                  </a:schemeClr>
-                </a:solidFill>
-              </a:rPr>
-              <a:t>Importância da estrutura organizacional da TI</a:t>
-            </a:r>
-          </a:p>
-        </p:txBody>
-      </p:sp>
-      <p:sp>
-        <p:nvSpPr>
-          <p:cNvPr id="18" name="Retângulo 17">
-            <a:extLst>
-              <a:ext uri="{FF2B5EF4-FFF2-40B4-BE49-F238E27FC236}">
-                <a16:creationId xmlns:a16="http://schemas.microsoft.com/office/drawing/2014/main" id="{188E9D1B-0E6E-4B15-AC88-3D39EC5BE838}"/>
-              </a:ext>
-            </a:extLst>
-          </p:cNvPr>
-          <p:cNvSpPr/>
-          <p:nvPr/>
-        </p:nvSpPr>
-        <p:spPr>
-          <a:xfrm>
-            <a:off x="64513" y="1177591"/>
-            <a:ext cx="2199565" cy="3077766"/>
-          </a:xfrm>
-          <a:prstGeom prst="rect">
-            <a:avLst/>
-          </a:prstGeom>
-        </p:spPr>
-        <p:style>
-          <a:lnRef idx="0">
-            <a:schemeClr val="accent3"/>
-          </a:lnRef>
-          <a:fillRef idx="3">
-            <a:schemeClr val="accent3"/>
-          </a:fillRef>
-          <a:effectRef idx="3">
-            <a:schemeClr val="accent3"/>
-          </a:effectRef>
-          <a:fontRef idx="minor">
-            <a:schemeClr val="lt1"/>
-          </a:fontRef>
-        </p:style>
-        <p:txBody>
-          <a:bodyPr wrap="square">
-            <a:spAutoFit/>
-          </a:bodyPr>
-          <a:lstStyle/>
-          <a:p>
-            <a:pPr>
-              <a:spcAft>
-                <a:spcPts val="1200"/>
-              </a:spcAft>
-              <a:buFont typeface="+mj-lt"/>
-              <a:buAutoNum type="arabicPeriod"/>
-            </a:pPr>
-            <a:r>
-              <a:rPr lang="pt-BR" sz="1600" b="1" dirty="0">
-                <a:solidFill>
-                  <a:schemeClr val="tx1">
-                    <a:lumMod val="65000"/>
-                    <a:lumOff val="35000"/>
-                  </a:schemeClr>
-                </a:solidFill>
-              </a:rPr>
-              <a:t>Especialização do trabalho</a:t>
-            </a:r>
-          </a:p>
-          <a:p>
-            <a:pPr>
-              <a:spcAft>
-                <a:spcPts val="1200"/>
-              </a:spcAft>
-              <a:buFont typeface="+mj-lt"/>
-              <a:buAutoNum type="arabicPeriod"/>
-            </a:pPr>
-            <a:r>
-              <a:rPr lang="pt-BR" sz="1600" b="1" dirty="0">
-                <a:solidFill>
-                  <a:schemeClr val="tx1">
-                    <a:lumMod val="65000"/>
-                    <a:lumOff val="35000"/>
-                  </a:schemeClr>
-                </a:solidFill>
-              </a:rPr>
-              <a:t>Departamentalização</a:t>
-            </a:r>
-          </a:p>
-          <a:p>
-            <a:pPr>
-              <a:spcAft>
-                <a:spcPts val="1200"/>
-              </a:spcAft>
-              <a:buFont typeface="+mj-lt"/>
-              <a:buAutoNum type="arabicPeriod"/>
-            </a:pPr>
-            <a:r>
-              <a:rPr lang="pt-BR" sz="1600" b="1" dirty="0">
-                <a:solidFill>
-                  <a:schemeClr val="tx1">
-                    <a:lumMod val="65000"/>
-                    <a:lumOff val="35000"/>
-                  </a:schemeClr>
-                </a:solidFill>
-              </a:rPr>
-              <a:t>Cadeia de comando</a:t>
-            </a:r>
-          </a:p>
-          <a:p>
-            <a:pPr>
-              <a:spcAft>
-                <a:spcPts val="1200"/>
-              </a:spcAft>
-              <a:buFont typeface="+mj-lt"/>
-              <a:buAutoNum type="arabicPeriod"/>
-            </a:pPr>
-            <a:r>
-              <a:rPr lang="pt-BR" sz="1600" b="1" dirty="0">
-                <a:solidFill>
-                  <a:schemeClr val="tx1">
-                    <a:lumMod val="65000"/>
-                    <a:lumOff val="35000"/>
-                  </a:schemeClr>
-                </a:solidFill>
-              </a:rPr>
-              <a:t>Amplitude de controle</a:t>
-            </a:r>
-          </a:p>
-          <a:p>
-            <a:pPr>
-              <a:spcAft>
-                <a:spcPts val="1200"/>
-              </a:spcAft>
-              <a:buFont typeface="+mj-lt"/>
-              <a:buAutoNum type="arabicPeriod"/>
-            </a:pPr>
-            <a:r>
-              <a:rPr lang="pt-BR" sz="1600" b="1" dirty="0">
-                <a:solidFill>
-                  <a:schemeClr val="tx1">
-                    <a:lumMod val="65000"/>
-                    <a:lumOff val="35000"/>
-                  </a:schemeClr>
-                </a:solidFill>
-              </a:rPr>
-              <a:t>Centralização e descentralização</a:t>
-            </a:r>
-          </a:p>
-          <a:p>
-            <a:pPr>
-              <a:spcAft>
-                <a:spcPts val="1200"/>
-              </a:spcAft>
-              <a:buFont typeface="+mj-lt"/>
-              <a:buAutoNum type="arabicPeriod"/>
-            </a:pPr>
-            <a:r>
-              <a:rPr lang="pt-BR" sz="1600" b="1" dirty="0">
-                <a:solidFill>
-                  <a:srgbClr val="0066FF"/>
-                </a:solidFill>
-              </a:rPr>
-              <a:t>Formalização</a:t>
-            </a:r>
-          </a:p>
-        </p:txBody>
-      </p:sp>
-    </p:spTree>
-    <p:extLst>
-      <p:ext uri="{BB962C8B-B14F-4D97-AF65-F5344CB8AC3E}">
-        <p14:creationId xmlns:p14="http://schemas.microsoft.com/office/powerpoint/2010/main" val="1288245862"/>
-      </p:ext>
-    </p:extLst>
-  </p:cSld>
-  <p:clrMapOvr>
-    <a:masterClrMapping/>
-  </p:clrMapOvr>
-</p:sld>
-</file>
-
-<file path=ppt/slides/slide15.xml><?xml version="1.0" encoding="utf-8"?>
-<p:sld xmlns:a="http://schemas.openxmlformats.org/drawingml/2006/main" xmlns:r="http://schemas.openxmlformats.org/officeDocument/2006/relationships" xmlns:p="http://schemas.openxmlformats.org/presentationml/2006/main">
-  <p:cSld>
-    <p:spTree>
-      <p:nvGrpSpPr>
-        <p:cNvPr id="1" name=""/>
-        <p:cNvGrpSpPr/>
-        <p:nvPr/>
-      </p:nvGrpSpPr>
-      <p:grpSpPr>
-        <a:xfrm>
-          <a:off x="0" y="0"/>
-          <a:ext cx="0" cy="0"/>
-          <a:chOff x="0" y="0"/>
-          <a:chExt cx="0" cy="0"/>
-        </a:xfrm>
-      </p:grpSpPr>
-      <p:sp>
-        <p:nvSpPr>
           <p:cNvPr id="20" name="Retângulo 10"/>
           <p:cNvSpPr/>
           <p:nvPr/>
@@ -5974,7 +4561,290 @@
 </p:sld>
 </file>
 
-<file path=ppt/slides/slide16.xml><?xml version="1.0" encoding="utf-8"?>
+<file path=ppt/slides/slide11.xml><?xml version="1.0" encoding="utf-8"?>
+<p:sld xmlns:a="http://schemas.openxmlformats.org/drawingml/2006/main" xmlns:r="http://schemas.openxmlformats.org/officeDocument/2006/relationships" xmlns:p="http://schemas.openxmlformats.org/presentationml/2006/main">
+  <p:cSld>
+    <p:spTree>
+      <p:nvGrpSpPr>
+        <p:cNvPr id="1" name=""/>
+        <p:cNvGrpSpPr/>
+        <p:nvPr/>
+      </p:nvGrpSpPr>
+      <p:grpSpPr>
+        <a:xfrm>
+          <a:off x="0" y="0"/>
+          <a:ext cx="0" cy="0"/>
+          <a:chOff x="0" y="0"/>
+          <a:chExt cx="0" cy="0"/>
+        </a:xfrm>
+      </p:grpSpPr>
+      <p:sp>
+        <p:nvSpPr>
+          <p:cNvPr id="17" name="CaixaDeTexto 16"/>
+          <p:cNvSpPr txBox="1"/>
+          <p:nvPr/>
+        </p:nvSpPr>
+        <p:spPr>
+          <a:xfrm>
+            <a:off x="2571624" y="-16026"/>
+            <a:ext cx="5264322" cy="338554"/>
+          </a:xfrm>
+          <a:prstGeom prst="rect">
+            <a:avLst/>
+          </a:prstGeom>
+          <a:noFill/>
+        </p:spPr>
+        <p:txBody>
+          <a:bodyPr wrap="square" rtlCol="0">
+            <a:spAutoFit/>
+          </a:bodyPr>
+          <a:lstStyle/>
+          <a:p>
+            <a:r>
+              <a:rPr lang="pt-BR" sz="1600" b="1" dirty="0">
+                <a:solidFill>
+                  <a:schemeClr val="tx1">
+                    <a:lumMod val="65000"/>
+                    <a:lumOff val="35000"/>
+                  </a:schemeClr>
+                </a:solidFill>
+              </a:rPr>
+              <a:t>Importância da estrutura organizacional da TI</a:t>
+            </a:r>
+          </a:p>
+        </p:txBody>
+      </p:sp>
+      <p:pic>
+        <p:nvPicPr>
+          <p:cNvPr id="4" name="Picture 3">
+            <a:extLst>
+              <a:ext uri="{FF2B5EF4-FFF2-40B4-BE49-F238E27FC236}">
+                <a16:creationId xmlns:a16="http://schemas.microsoft.com/office/drawing/2014/main" id="{ABCB0B9D-AD6D-4CB4-B01C-08445AA89BCE}"/>
+              </a:ext>
+            </a:extLst>
+          </p:cNvPr>
+          <p:cNvPicPr>
+            <a:picLocks noChangeAspect="1" noChangeArrowheads="1"/>
+          </p:cNvPicPr>
+          <p:nvPr/>
+        </p:nvPicPr>
+        <p:blipFill rotWithShape="1">
+          <a:blip r:embed="rId2">
+            <a:extLst>
+              <a:ext uri="{28A0092B-C50C-407E-A947-70E740481C1C}">
+                <a14:useLocalDpi xmlns:a14="http://schemas.microsoft.com/office/drawing/2010/main" val="0"/>
+              </a:ext>
+            </a:extLst>
+          </a:blip>
+          <a:srcRect l="1660" t="2018" r="1966" b="2416"/>
+          <a:stretch/>
+        </p:blipFill>
+        <p:spPr bwMode="auto">
+          <a:xfrm>
+            <a:off x="2333207" y="322528"/>
+            <a:ext cx="5823296" cy="4550778"/>
+          </a:xfrm>
+          <a:prstGeom prst="rect">
+            <a:avLst/>
+          </a:prstGeom>
+          <a:noFill/>
+          <a:ln>
+            <a:noFill/>
+          </a:ln>
+          <a:extLst>
+            <a:ext uri="{909E8E84-426E-40DD-AFC4-6F175D3DCCD1}">
+              <a14:hiddenFill xmlns:a14="http://schemas.microsoft.com/office/drawing/2010/main">
+                <a:solidFill>
+                  <a:schemeClr val="accent1"/>
+                </a:solidFill>
+              </a14:hiddenFill>
+            </a:ext>
+            <a:ext uri="{91240B29-F687-4F45-9708-019B960494DF}">
+              <a14:hiddenLine xmlns:a14="http://schemas.microsoft.com/office/drawing/2010/main" w="9525">
+                <a:solidFill>
+                  <a:schemeClr val="tx1"/>
+                </a:solidFill>
+                <a:miter lim="800000"/>
+                <a:headEnd/>
+                <a:tailEnd/>
+              </a14:hiddenLine>
+            </a:ext>
+          </a:extLst>
+        </p:spPr>
+      </p:pic>
+      <p:sp>
+        <p:nvSpPr>
+          <p:cNvPr id="5" name="Retângulo 4">
+            <a:extLst>
+              <a:ext uri="{FF2B5EF4-FFF2-40B4-BE49-F238E27FC236}">
+                <a16:creationId xmlns:a16="http://schemas.microsoft.com/office/drawing/2014/main" id="{7EAFE6EF-A115-4154-ABC7-C3264A29432E}"/>
+              </a:ext>
+            </a:extLst>
+          </p:cNvPr>
+          <p:cNvSpPr/>
+          <p:nvPr/>
+        </p:nvSpPr>
+        <p:spPr>
+          <a:xfrm>
+            <a:off x="64513" y="1177591"/>
+            <a:ext cx="2199565" cy="3077766"/>
+          </a:xfrm>
+          <a:prstGeom prst="rect">
+            <a:avLst/>
+          </a:prstGeom>
+        </p:spPr>
+        <p:style>
+          <a:lnRef idx="0">
+            <a:schemeClr val="accent3"/>
+          </a:lnRef>
+          <a:fillRef idx="3">
+            <a:schemeClr val="accent3"/>
+          </a:fillRef>
+          <a:effectRef idx="3">
+            <a:schemeClr val="accent3"/>
+          </a:effectRef>
+          <a:fontRef idx="minor">
+            <a:schemeClr val="lt1"/>
+          </a:fontRef>
+        </p:style>
+        <p:txBody>
+          <a:bodyPr wrap="square">
+            <a:spAutoFit/>
+          </a:bodyPr>
+          <a:lstStyle/>
+          <a:p>
+            <a:pPr>
+              <a:spcAft>
+                <a:spcPts val="1200"/>
+              </a:spcAft>
+              <a:buFont typeface="+mj-lt"/>
+              <a:buAutoNum type="arabicPeriod"/>
+            </a:pPr>
+            <a:r>
+              <a:rPr lang="pt-BR" sz="1600" b="1" dirty="0">
+                <a:solidFill>
+                  <a:schemeClr val="tx1">
+                    <a:lumMod val="65000"/>
+                    <a:lumOff val="35000"/>
+                  </a:schemeClr>
+                </a:solidFill>
+              </a:rPr>
+              <a:t>Especialização do trabalho</a:t>
+            </a:r>
+          </a:p>
+          <a:p>
+            <a:pPr>
+              <a:spcAft>
+                <a:spcPts val="1200"/>
+              </a:spcAft>
+              <a:buFont typeface="+mj-lt"/>
+              <a:buAutoNum type="arabicPeriod"/>
+            </a:pPr>
+            <a:r>
+              <a:rPr lang="pt-BR" sz="1600" b="1" dirty="0">
+                <a:solidFill>
+                  <a:srgbClr val="0066FF"/>
+                </a:solidFill>
+              </a:rPr>
+              <a:t>Departamentalização</a:t>
+            </a:r>
+          </a:p>
+          <a:p>
+            <a:pPr>
+              <a:spcAft>
+                <a:spcPts val="1200"/>
+              </a:spcAft>
+              <a:buFont typeface="+mj-lt"/>
+              <a:buAutoNum type="arabicPeriod"/>
+            </a:pPr>
+            <a:r>
+              <a:rPr lang="pt-BR" sz="1600" b="1" dirty="0">
+                <a:solidFill>
+                  <a:schemeClr val="tx1">
+                    <a:lumMod val="65000"/>
+                    <a:lumOff val="35000"/>
+                  </a:schemeClr>
+                </a:solidFill>
+              </a:rPr>
+              <a:t>Cadeia de comando</a:t>
+            </a:r>
+          </a:p>
+          <a:p>
+            <a:pPr>
+              <a:spcAft>
+                <a:spcPts val="1200"/>
+              </a:spcAft>
+              <a:buFont typeface="+mj-lt"/>
+              <a:buAutoNum type="arabicPeriod"/>
+            </a:pPr>
+            <a:r>
+              <a:rPr lang="pt-BR" sz="1600" b="1" dirty="0">
+                <a:solidFill>
+                  <a:schemeClr val="tx1">
+                    <a:lumMod val="65000"/>
+                    <a:lumOff val="35000"/>
+                  </a:schemeClr>
+                </a:solidFill>
+              </a:rPr>
+              <a:t>Amplitude de controle</a:t>
+            </a:r>
+          </a:p>
+          <a:p>
+            <a:pPr>
+              <a:spcAft>
+                <a:spcPts val="1200"/>
+              </a:spcAft>
+              <a:buFont typeface="+mj-lt"/>
+              <a:buAutoNum type="arabicPeriod"/>
+            </a:pPr>
+            <a:r>
+              <a:rPr lang="pt-BR" sz="1600" b="1" dirty="0">
+                <a:solidFill>
+                  <a:schemeClr val="tx1">
+                    <a:lumMod val="65000"/>
+                    <a:lumOff val="35000"/>
+                  </a:schemeClr>
+                </a:solidFill>
+              </a:rPr>
+              <a:t>Centralização e descentralização</a:t>
+            </a:r>
+          </a:p>
+          <a:p>
+            <a:pPr>
+              <a:spcAft>
+                <a:spcPts val="1200"/>
+              </a:spcAft>
+              <a:buFont typeface="+mj-lt"/>
+              <a:buAutoNum type="arabicPeriod"/>
+            </a:pPr>
+            <a:r>
+              <a:rPr lang="pt-BR" sz="1600" b="1" dirty="0">
+                <a:solidFill>
+                  <a:schemeClr val="tx1">
+                    <a:lumMod val="65000"/>
+                    <a:lumOff val="35000"/>
+                  </a:schemeClr>
+                </a:solidFill>
+              </a:rPr>
+              <a:t>Formalização</a:t>
+            </a:r>
+          </a:p>
+        </p:txBody>
+      </p:sp>
+    </p:spTree>
+    <p:extLst>
+      <p:ext uri="{BB962C8B-B14F-4D97-AF65-F5344CB8AC3E}">
+        <p14:creationId xmlns:p14="http://schemas.microsoft.com/office/powerpoint/2010/main" val="2352844542"/>
+      </p:ext>
+    </p:extLst>
+  </p:cSld>
+  <p:clrMapOvr>
+    <a:masterClrMapping/>
+  </p:clrMapOvr>
+</p:sld>
+</file>
+
+<file path=ppt/slides/slide12.xml><?xml version="1.0" encoding="utf-8"?>
 <p:sld xmlns:a="http://schemas.openxmlformats.org/drawingml/2006/main" xmlns:r="http://schemas.openxmlformats.org/officeDocument/2006/relationships" xmlns:p="http://schemas.openxmlformats.org/presentationml/2006/main">
   <p:cSld>
     <p:spTree>
@@ -6560,7 +5430,290 @@
 </p:sld>
 </file>
 
-<file path=ppt/slides/slide17.xml><?xml version="1.0" encoding="utf-8"?>
+<file path=ppt/slides/slide13.xml><?xml version="1.0" encoding="utf-8"?>
+<p:sld xmlns:a="http://schemas.openxmlformats.org/drawingml/2006/main" xmlns:r="http://schemas.openxmlformats.org/officeDocument/2006/relationships" xmlns:p="http://schemas.openxmlformats.org/presentationml/2006/main">
+  <p:cSld>
+    <p:spTree>
+      <p:nvGrpSpPr>
+        <p:cNvPr id="1" name=""/>
+        <p:cNvGrpSpPr/>
+        <p:nvPr/>
+      </p:nvGrpSpPr>
+      <p:grpSpPr>
+        <a:xfrm>
+          <a:off x="0" y="0"/>
+          <a:ext cx="0" cy="0"/>
+          <a:chOff x="0" y="0"/>
+          <a:chExt cx="0" cy="0"/>
+        </a:xfrm>
+      </p:grpSpPr>
+      <p:sp>
+        <p:nvSpPr>
+          <p:cNvPr id="17" name="CaixaDeTexto 16"/>
+          <p:cNvSpPr txBox="1"/>
+          <p:nvPr/>
+        </p:nvSpPr>
+        <p:spPr>
+          <a:xfrm>
+            <a:off x="2571624" y="-16026"/>
+            <a:ext cx="5264322" cy="338554"/>
+          </a:xfrm>
+          <a:prstGeom prst="rect">
+            <a:avLst/>
+          </a:prstGeom>
+          <a:noFill/>
+        </p:spPr>
+        <p:txBody>
+          <a:bodyPr wrap="square" rtlCol="0">
+            <a:spAutoFit/>
+          </a:bodyPr>
+          <a:lstStyle/>
+          <a:p>
+            <a:r>
+              <a:rPr lang="pt-BR" sz="1600" b="1" dirty="0">
+                <a:solidFill>
+                  <a:schemeClr val="tx1">
+                    <a:lumMod val="65000"/>
+                    <a:lumOff val="35000"/>
+                  </a:schemeClr>
+                </a:solidFill>
+              </a:rPr>
+              <a:t>Importância da estrutura organizacional da TI</a:t>
+            </a:r>
+          </a:p>
+        </p:txBody>
+      </p:sp>
+      <p:pic>
+        <p:nvPicPr>
+          <p:cNvPr id="4" name="Picture 3">
+            <a:extLst>
+              <a:ext uri="{FF2B5EF4-FFF2-40B4-BE49-F238E27FC236}">
+                <a16:creationId xmlns:a16="http://schemas.microsoft.com/office/drawing/2014/main" id="{9ACDD883-8D8F-4E13-A6F0-D0312E3CFB1D}"/>
+              </a:ext>
+            </a:extLst>
+          </p:cNvPr>
+          <p:cNvPicPr>
+            <a:picLocks noChangeAspect="1" noChangeArrowheads="1"/>
+          </p:cNvPicPr>
+          <p:nvPr/>
+        </p:nvPicPr>
+        <p:blipFill rotWithShape="1">
+          <a:blip r:embed="rId2">
+            <a:extLst>
+              <a:ext uri="{28A0092B-C50C-407E-A947-70E740481C1C}">
+                <a14:useLocalDpi xmlns:a14="http://schemas.microsoft.com/office/drawing/2010/main" val="0"/>
+              </a:ext>
+            </a:extLst>
+          </a:blip>
+          <a:srcRect l="1508" t="1903" r="1359" b="2908"/>
+          <a:stretch/>
+        </p:blipFill>
+        <p:spPr bwMode="auto">
+          <a:xfrm>
+            <a:off x="2283725" y="277503"/>
+            <a:ext cx="5919521" cy="4676633"/>
+          </a:xfrm>
+          <a:prstGeom prst="rect">
+            <a:avLst/>
+          </a:prstGeom>
+          <a:noFill/>
+          <a:ln>
+            <a:noFill/>
+          </a:ln>
+          <a:extLst>
+            <a:ext uri="{909E8E84-426E-40DD-AFC4-6F175D3DCCD1}">
+              <a14:hiddenFill xmlns:a14="http://schemas.microsoft.com/office/drawing/2010/main">
+                <a:solidFill>
+                  <a:schemeClr val="accent1"/>
+                </a:solidFill>
+              </a14:hiddenFill>
+            </a:ext>
+            <a:ext uri="{91240B29-F687-4F45-9708-019B960494DF}">
+              <a14:hiddenLine xmlns:a14="http://schemas.microsoft.com/office/drawing/2010/main" w="9525">
+                <a:solidFill>
+                  <a:schemeClr val="tx1"/>
+                </a:solidFill>
+                <a:miter lim="800000"/>
+                <a:headEnd/>
+                <a:tailEnd/>
+              </a14:hiddenLine>
+            </a:ext>
+          </a:extLst>
+        </p:spPr>
+      </p:pic>
+      <p:sp>
+        <p:nvSpPr>
+          <p:cNvPr id="5" name="Retângulo 4">
+            <a:extLst>
+              <a:ext uri="{FF2B5EF4-FFF2-40B4-BE49-F238E27FC236}">
+                <a16:creationId xmlns:a16="http://schemas.microsoft.com/office/drawing/2014/main" id="{AF23D369-0E91-4613-BAD4-BA83ABBBC28B}"/>
+              </a:ext>
+            </a:extLst>
+          </p:cNvPr>
+          <p:cNvSpPr/>
+          <p:nvPr/>
+        </p:nvSpPr>
+        <p:spPr>
+          <a:xfrm>
+            <a:off x="64513" y="1177591"/>
+            <a:ext cx="2199565" cy="3077766"/>
+          </a:xfrm>
+          <a:prstGeom prst="rect">
+            <a:avLst/>
+          </a:prstGeom>
+        </p:spPr>
+        <p:style>
+          <a:lnRef idx="0">
+            <a:schemeClr val="accent3"/>
+          </a:lnRef>
+          <a:fillRef idx="3">
+            <a:schemeClr val="accent3"/>
+          </a:fillRef>
+          <a:effectRef idx="3">
+            <a:schemeClr val="accent3"/>
+          </a:effectRef>
+          <a:fontRef idx="minor">
+            <a:schemeClr val="lt1"/>
+          </a:fontRef>
+        </p:style>
+        <p:txBody>
+          <a:bodyPr wrap="square">
+            <a:spAutoFit/>
+          </a:bodyPr>
+          <a:lstStyle/>
+          <a:p>
+            <a:pPr>
+              <a:spcAft>
+                <a:spcPts val="1200"/>
+              </a:spcAft>
+              <a:buFont typeface="+mj-lt"/>
+              <a:buAutoNum type="arabicPeriod"/>
+            </a:pPr>
+            <a:r>
+              <a:rPr lang="pt-BR" sz="1600" b="1" dirty="0">
+                <a:solidFill>
+                  <a:schemeClr val="tx1">
+                    <a:lumMod val="65000"/>
+                    <a:lumOff val="35000"/>
+                  </a:schemeClr>
+                </a:solidFill>
+              </a:rPr>
+              <a:t>Especialização do trabalho</a:t>
+            </a:r>
+          </a:p>
+          <a:p>
+            <a:pPr>
+              <a:spcAft>
+                <a:spcPts val="1200"/>
+              </a:spcAft>
+              <a:buFont typeface="+mj-lt"/>
+              <a:buAutoNum type="arabicPeriod"/>
+            </a:pPr>
+            <a:r>
+              <a:rPr lang="pt-BR" sz="1600" b="1" dirty="0">
+                <a:solidFill>
+                  <a:schemeClr val="tx1">
+                    <a:lumMod val="65000"/>
+                    <a:lumOff val="35000"/>
+                  </a:schemeClr>
+                </a:solidFill>
+              </a:rPr>
+              <a:t>Departamentalização</a:t>
+            </a:r>
+          </a:p>
+          <a:p>
+            <a:pPr>
+              <a:spcAft>
+                <a:spcPts val="1200"/>
+              </a:spcAft>
+              <a:buFont typeface="+mj-lt"/>
+              <a:buAutoNum type="arabicPeriod"/>
+            </a:pPr>
+            <a:r>
+              <a:rPr lang="pt-BR" sz="1600" b="1" dirty="0">
+                <a:solidFill>
+                  <a:srgbClr val="0066FF"/>
+                </a:solidFill>
+              </a:rPr>
+              <a:t>Cadeia de comando</a:t>
+            </a:r>
+          </a:p>
+          <a:p>
+            <a:pPr>
+              <a:spcAft>
+                <a:spcPts val="1200"/>
+              </a:spcAft>
+              <a:buFont typeface="+mj-lt"/>
+              <a:buAutoNum type="arabicPeriod"/>
+            </a:pPr>
+            <a:r>
+              <a:rPr lang="pt-BR" sz="1600" b="1" dirty="0">
+                <a:solidFill>
+                  <a:schemeClr val="tx1">
+                    <a:lumMod val="65000"/>
+                    <a:lumOff val="35000"/>
+                  </a:schemeClr>
+                </a:solidFill>
+              </a:rPr>
+              <a:t>Amplitude de controle</a:t>
+            </a:r>
+          </a:p>
+          <a:p>
+            <a:pPr>
+              <a:spcAft>
+                <a:spcPts val="1200"/>
+              </a:spcAft>
+              <a:buFont typeface="+mj-lt"/>
+              <a:buAutoNum type="arabicPeriod"/>
+            </a:pPr>
+            <a:r>
+              <a:rPr lang="pt-BR" sz="1600" b="1" dirty="0">
+                <a:solidFill>
+                  <a:schemeClr val="tx1">
+                    <a:lumMod val="65000"/>
+                    <a:lumOff val="35000"/>
+                  </a:schemeClr>
+                </a:solidFill>
+              </a:rPr>
+              <a:t>Centralização e descentralização</a:t>
+            </a:r>
+          </a:p>
+          <a:p>
+            <a:pPr>
+              <a:spcAft>
+                <a:spcPts val="1200"/>
+              </a:spcAft>
+              <a:buFont typeface="+mj-lt"/>
+              <a:buAutoNum type="arabicPeriod"/>
+            </a:pPr>
+            <a:r>
+              <a:rPr lang="pt-BR" sz="1600" b="1" dirty="0">
+                <a:solidFill>
+                  <a:schemeClr val="tx1">
+                    <a:lumMod val="65000"/>
+                    <a:lumOff val="35000"/>
+                  </a:schemeClr>
+                </a:solidFill>
+              </a:rPr>
+              <a:t>Formalização</a:t>
+            </a:r>
+          </a:p>
+        </p:txBody>
+      </p:sp>
+    </p:spTree>
+    <p:extLst>
+      <p:ext uri="{BB962C8B-B14F-4D97-AF65-F5344CB8AC3E}">
+        <p14:creationId xmlns:p14="http://schemas.microsoft.com/office/powerpoint/2010/main" val="3371471048"/>
+      </p:ext>
+    </p:extLst>
+  </p:cSld>
+  <p:clrMapOvr>
+    <a:masterClrMapping/>
+  </p:clrMapOvr>
+</p:sld>
+</file>
+
+<file path=ppt/slides/slide14.xml><?xml version="1.0" encoding="utf-8"?>
 <p:sld xmlns:a="http://schemas.openxmlformats.org/drawingml/2006/main" xmlns:r="http://schemas.openxmlformats.org/officeDocument/2006/relationships" xmlns:p="http://schemas.openxmlformats.org/presentationml/2006/main">
   <p:cSld>
     <p:spTree>
@@ -7225,7 +6378,865 @@
 </p:sld>
 </file>
 
-<file path=ppt/slides/slide18.xml><?xml version="1.0" encoding="utf-8"?>
+<file path=ppt/slides/slide15.xml><?xml version="1.0" encoding="utf-8"?>
+<p:sld xmlns:a="http://schemas.openxmlformats.org/drawingml/2006/main" xmlns:r="http://schemas.openxmlformats.org/officeDocument/2006/relationships" xmlns:p="http://schemas.openxmlformats.org/presentationml/2006/main">
+  <p:cSld>
+    <p:spTree>
+      <p:nvGrpSpPr>
+        <p:cNvPr id="1" name=""/>
+        <p:cNvGrpSpPr/>
+        <p:nvPr/>
+      </p:nvGrpSpPr>
+      <p:grpSpPr>
+        <a:xfrm>
+          <a:off x="0" y="0"/>
+          <a:ext cx="0" cy="0"/>
+          <a:chOff x="0" y="0"/>
+          <a:chExt cx="0" cy="0"/>
+        </a:xfrm>
+      </p:grpSpPr>
+      <p:sp>
+        <p:nvSpPr>
+          <p:cNvPr id="17" name="CaixaDeTexto 16"/>
+          <p:cNvSpPr txBox="1"/>
+          <p:nvPr/>
+        </p:nvSpPr>
+        <p:spPr>
+          <a:xfrm>
+            <a:off x="2571624" y="-16026"/>
+            <a:ext cx="5264322" cy="338554"/>
+          </a:xfrm>
+          <a:prstGeom prst="rect">
+            <a:avLst/>
+          </a:prstGeom>
+          <a:noFill/>
+        </p:spPr>
+        <p:txBody>
+          <a:bodyPr wrap="square" rtlCol="0">
+            <a:spAutoFit/>
+          </a:bodyPr>
+          <a:lstStyle/>
+          <a:p>
+            <a:r>
+              <a:rPr lang="pt-BR" sz="1600" b="1" dirty="0">
+                <a:solidFill>
+                  <a:schemeClr val="tx1">
+                    <a:lumMod val="65000"/>
+                    <a:lumOff val="35000"/>
+                  </a:schemeClr>
+                </a:solidFill>
+              </a:rPr>
+              <a:t>Importância da estrutura organizacional da TI</a:t>
+            </a:r>
+          </a:p>
+        </p:txBody>
+      </p:sp>
+      <p:pic>
+        <p:nvPicPr>
+          <p:cNvPr id="4" name="Picture 5">
+            <a:extLst>
+              <a:ext uri="{FF2B5EF4-FFF2-40B4-BE49-F238E27FC236}">
+                <a16:creationId xmlns:a16="http://schemas.microsoft.com/office/drawing/2014/main" id="{FFF51428-E4E3-49E0-A2BD-79FDE803A7F7}"/>
+              </a:ext>
+            </a:extLst>
+          </p:cNvPr>
+          <p:cNvPicPr>
+            <a:picLocks noChangeAspect="1" noChangeArrowheads="1"/>
+          </p:cNvPicPr>
+          <p:nvPr/>
+        </p:nvPicPr>
+        <p:blipFill rotWithShape="1">
+          <a:blip r:embed="rId2">
+            <a:extLst>
+              <a:ext uri="{28A0092B-C50C-407E-A947-70E740481C1C}">
+                <a14:useLocalDpi xmlns:a14="http://schemas.microsoft.com/office/drawing/2010/main" val="0"/>
+              </a:ext>
+            </a:extLst>
+          </a:blip>
+          <a:srcRect l="1596" t="2680" r="1629" b="3463"/>
+          <a:stretch/>
+        </p:blipFill>
+        <p:spPr bwMode="auto">
+          <a:xfrm>
+            <a:off x="2260417" y="263909"/>
+            <a:ext cx="5900944" cy="4615682"/>
+          </a:xfrm>
+          <a:prstGeom prst="rect">
+            <a:avLst/>
+          </a:prstGeom>
+          <a:noFill/>
+          <a:ln>
+            <a:noFill/>
+          </a:ln>
+          <a:extLst>
+            <a:ext uri="{909E8E84-426E-40DD-AFC4-6F175D3DCCD1}">
+              <a14:hiddenFill xmlns:a14="http://schemas.microsoft.com/office/drawing/2010/main">
+                <a:solidFill>
+                  <a:schemeClr val="accent1"/>
+                </a:solidFill>
+              </a14:hiddenFill>
+            </a:ext>
+            <a:ext uri="{91240B29-F687-4F45-9708-019B960494DF}">
+              <a14:hiddenLine xmlns:a14="http://schemas.microsoft.com/office/drawing/2010/main" w="9525">
+                <a:solidFill>
+                  <a:schemeClr val="tx1"/>
+                </a:solidFill>
+                <a:miter lim="800000"/>
+                <a:headEnd/>
+                <a:tailEnd/>
+              </a14:hiddenLine>
+            </a:ext>
+          </a:extLst>
+        </p:spPr>
+      </p:pic>
+      <p:sp>
+        <p:nvSpPr>
+          <p:cNvPr id="5" name="Retângulo 4">
+            <a:extLst>
+              <a:ext uri="{FF2B5EF4-FFF2-40B4-BE49-F238E27FC236}">
+                <a16:creationId xmlns:a16="http://schemas.microsoft.com/office/drawing/2014/main" id="{DB105AE0-055A-4EA3-AB17-6DFE02F9C17F}"/>
+              </a:ext>
+            </a:extLst>
+          </p:cNvPr>
+          <p:cNvSpPr/>
+          <p:nvPr/>
+        </p:nvSpPr>
+        <p:spPr>
+          <a:xfrm>
+            <a:off x="64513" y="1177591"/>
+            <a:ext cx="2199565" cy="3077766"/>
+          </a:xfrm>
+          <a:prstGeom prst="rect">
+            <a:avLst/>
+          </a:prstGeom>
+        </p:spPr>
+        <p:style>
+          <a:lnRef idx="0">
+            <a:schemeClr val="accent3"/>
+          </a:lnRef>
+          <a:fillRef idx="3">
+            <a:schemeClr val="accent3"/>
+          </a:fillRef>
+          <a:effectRef idx="3">
+            <a:schemeClr val="accent3"/>
+          </a:effectRef>
+          <a:fontRef idx="minor">
+            <a:schemeClr val="lt1"/>
+          </a:fontRef>
+        </p:style>
+        <p:txBody>
+          <a:bodyPr wrap="square">
+            <a:spAutoFit/>
+          </a:bodyPr>
+          <a:lstStyle/>
+          <a:p>
+            <a:pPr>
+              <a:spcAft>
+                <a:spcPts val="1200"/>
+              </a:spcAft>
+              <a:buFont typeface="+mj-lt"/>
+              <a:buAutoNum type="arabicPeriod"/>
+            </a:pPr>
+            <a:r>
+              <a:rPr lang="pt-BR" sz="1600" b="1" dirty="0">
+                <a:solidFill>
+                  <a:schemeClr val="tx1">
+                    <a:lumMod val="65000"/>
+                    <a:lumOff val="35000"/>
+                  </a:schemeClr>
+                </a:solidFill>
+              </a:rPr>
+              <a:t>Especialização do trabalho</a:t>
+            </a:r>
+          </a:p>
+          <a:p>
+            <a:pPr>
+              <a:spcAft>
+                <a:spcPts val="1200"/>
+              </a:spcAft>
+              <a:buFont typeface="+mj-lt"/>
+              <a:buAutoNum type="arabicPeriod"/>
+            </a:pPr>
+            <a:r>
+              <a:rPr lang="pt-BR" sz="1600" b="1" dirty="0">
+                <a:solidFill>
+                  <a:schemeClr val="tx1">
+                    <a:lumMod val="65000"/>
+                    <a:lumOff val="35000"/>
+                  </a:schemeClr>
+                </a:solidFill>
+              </a:rPr>
+              <a:t>Departamentalização</a:t>
+            </a:r>
+          </a:p>
+          <a:p>
+            <a:pPr>
+              <a:spcAft>
+                <a:spcPts val="1200"/>
+              </a:spcAft>
+              <a:buFont typeface="+mj-lt"/>
+              <a:buAutoNum type="arabicPeriod"/>
+            </a:pPr>
+            <a:r>
+              <a:rPr lang="pt-BR" sz="1600" b="1" dirty="0">
+                <a:solidFill>
+                  <a:schemeClr val="tx1">
+                    <a:lumMod val="65000"/>
+                    <a:lumOff val="35000"/>
+                  </a:schemeClr>
+                </a:solidFill>
+              </a:rPr>
+              <a:t>Cadeia de comando</a:t>
+            </a:r>
+          </a:p>
+          <a:p>
+            <a:pPr>
+              <a:spcAft>
+                <a:spcPts val="1200"/>
+              </a:spcAft>
+              <a:buFont typeface="+mj-lt"/>
+              <a:buAutoNum type="arabicPeriod"/>
+            </a:pPr>
+            <a:r>
+              <a:rPr lang="pt-BR" sz="1600" b="1" dirty="0">
+                <a:solidFill>
+                  <a:srgbClr val="0066FF"/>
+                </a:solidFill>
+              </a:rPr>
+              <a:t>Amplitude de controle</a:t>
+            </a:r>
+          </a:p>
+          <a:p>
+            <a:pPr>
+              <a:spcAft>
+                <a:spcPts val="1200"/>
+              </a:spcAft>
+              <a:buFont typeface="+mj-lt"/>
+              <a:buAutoNum type="arabicPeriod"/>
+            </a:pPr>
+            <a:r>
+              <a:rPr lang="pt-BR" sz="1600" b="1" dirty="0">
+                <a:solidFill>
+                  <a:schemeClr val="tx1">
+                    <a:lumMod val="65000"/>
+                    <a:lumOff val="35000"/>
+                  </a:schemeClr>
+                </a:solidFill>
+              </a:rPr>
+              <a:t>Centralização e descentralização</a:t>
+            </a:r>
+          </a:p>
+          <a:p>
+            <a:pPr>
+              <a:spcAft>
+                <a:spcPts val="1200"/>
+              </a:spcAft>
+              <a:buFont typeface="+mj-lt"/>
+              <a:buAutoNum type="arabicPeriod"/>
+            </a:pPr>
+            <a:r>
+              <a:rPr lang="pt-BR" sz="1600" b="1" dirty="0">
+                <a:solidFill>
+                  <a:schemeClr val="tx1">
+                    <a:lumMod val="65000"/>
+                    <a:lumOff val="35000"/>
+                  </a:schemeClr>
+                </a:solidFill>
+              </a:rPr>
+              <a:t>Formalização</a:t>
+            </a:r>
+          </a:p>
+        </p:txBody>
+      </p:sp>
+    </p:spTree>
+    <p:extLst>
+      <p:ext uri="{BB962C8B-B14F-4D97-AF65-F5344CB8AC3E}">
+        <p14:creationId xmlns:p14="http://schemas.microsoft.com/office/powerpoint/2010/main" val="1684320631"/>
+      </p:ext>
+    </p:extLst>
+  </p:cSld>
+  <p:clrMapOvr>
+    <a:masterClrMapping/>
+  </p:clrMapOvr>
+</p:sld>
+</file>
+
+<file path=ppt/slides/slide16.xml><?xml version="1.0" encoding="utf-8"?>
+<p:sld xmlns:a="http://schemas.openxmlformats.org/drawingml/2006/main" xmlns:r="http://schemas.openxmlformats.org/officeDocument/2006/relationships" xmlns:p="http://schemas.openxmlformats.org/presentationml/2006/main">
+  <p:cSld>
+    <p:spTree>
+      <p:nvGrpSpPr>
+        <p:cNvPr id="1" name=""/>
+        <p:cNvGrpSpPr/>
+        <p:nvPr/>
+      </p:nvGrpSpPr>
+      <p:grpSpPr>
+        <a:xfrm>
+          <a:off x="0" y="0"/>
+          <a:ext cx="0" cy="0"/>
+          <a:chOff x="0" y="0"/>
+          <a:chExt cx="0" cy="0"/>
+        </a:xfrm>
+      </p:grpSpPr>
+      <p:sp>
+        <p:nvSpPr>
+          <p:cNvPr id="20" name="Retângulo 10"/>
+          <p:cNvSpPr/>
+          <p:nvPr/>
+        </p:nvSpPr>
+        <p:spPr>
+          <a:xfrm rot="275902">
+            <a:off x="8117877" y="1387678"/>
+            <a:ext cx="626363" cy="541902"/>
+          </a:xfrm>
+          <a:custGeom>
+            <a:avLst/>
+            <a:gdLst>
+              <a:gd name="connsiteX0" fmla="*/ 0 w 556537"/>
+              <a:gd name="connsiteY0" fmla="*/ 0 h 349397"/>
+              <a:gd name="connsiteX1" fmla="*/ 556537 w 556537"/>
+              <a:gd name="connsiteY1" fmla="*/ 0 h 349397"/>
+              <a:gd name="connsiteX2" fmla="*/ 556537 w 556537"/>
+              <a:gd name="connsiteY2" fmla="*/ 349397 h 349397"/>
+              <a:gd name="connsiteX3" fmla="*/ 0 w 556537"/>
+              <a:gd name="connsiteY3" fmla="*/ 349397 h 349397"/>
+              <a:gd name="connsiteX4" fmla="*/ 0 w 556537"/>
+              <a:gd name="connsiteY4" fmla="*/ 0 h 349397"/>
+              <a:gd name="connsiteX0" fmla="*/ 0 w 568569"/>
+              <a:gd name="connsiteY0" fmla="*/ 0 h 541902"/>
+              <a:gd name="connsiteX1" fmla="*/ 556537 w 568569"/>
+              <a:gd name="connsiteY1" fmla="*/ 0 h 541902"/>
+              <a:gd name="connsiteX2" fmla="*/ 568569 w 568569"/>
+              <a:gd name="connsiteY2" fmla="*/ 541902 h 541902"/>
+              <a:gd name="connsiteX3" fmla="*/ 0 w 568569"/>
+              <a:gd name="connsiteY3" fmla="*/ 349397 h 541902"/>
+              <a:gd name="connsiteX4" fmla="*/ 0 w 568569"/>
+              <a:gd name="connsiteY4" fmla="*/ 0 h 541902"/>
+              <a:gd name="connsiteX0" fmla="*/ 0 w 568569"/>
+              <a:gd name="connsiteY0" fmla="*/ 0 h 541902"/>
+              <a:gd name="connsiteX1" fmla="*/ 556537 w 568569"/>
+              <a:gd name="connsiteY1" fmla="*/ 108284 h 541902"/>
+              <a:gd name="connsiteX2" fmla="*/ 568569 w 568569"/>
+              <a:gd name="connsiteY2" fmla="*/ 541902 h 541902"/>
+              <a:gd name="connsiteX3" fmla="*/ 0 w 568569"/>
+              <a:gd name="connsiteY3" fmla="*/ 349397 h 541902"/>
+              <a:gd name="connsiteX4" fmla="*/ 0 w 568569"/>
+              <a:gd name="connsiteY4" fmla="*/ 0 h 541902"/>
+            </a:gdLst>
+            <a:ahLst/>
+            <a:cxnLst>
+              <a:cxn ang="0">
+                <a:pos x="connsiteX0" y="connsiteY0"/>
+              </a:cxn>
+              <a:cxn ang="0">
+                <a:pos x="connsiteX1" y="connsiteY1"/>
+              </a:cxn>
+              <a:cxn ang="0">
+                <a:pos x="connsiteX2" y="connsiteY2"/>
+              </a:cxn>
+              <a:cxn ang="0">
+                <a:pos x="connsiteX3" y="connsiteY3"/>
+              </a:cxn>
+              <a:cxn ang="0">
+                <a:pos x="connsiteX4" y="connsiteY4"/>
+              </a:cxn>
+            </a:cxnLst>
+            <a:rect l="l" t="t" r="r" b="b"/>
+            <a:pathLst>
+              <a:path w="568569" h="541902">
+                <a:moveTo>
+                  <a:pt x="0" y="0"/>
+                </a:moveTo>
+                <a:lnTo>
+                  <a:pt x="556537" y="108284"/>
+                </a:lnTo>
+                <a:lnTo>
+                  <a:pt x="568569" y="541902"/>
+                </a:lnTo>
+                <a:lnTo>
+                  <a:pt x="0" y="349397"/>
+                </a:lnTo>
+                <a:lnTo>
+                  <a:pt x="0" y="0"/>
+                </a:lnTo>
+                <a:close/>
+              </a:path>
+            </a:pathLst>
+          </a:custGeom>
+          <a:solidFill>
+            <a:schemeClr val="bg1">
+              <a:lumMod val="75000"/>
+            </a:schemeClr>
+          </a:solidFill>
+          <a:ln>
+            <a:noFill/>
+          </a:ln>
+          <a:effectLst/>
+        </p:spPr>
+        <p:style>
+          <a:lnRef idx="1">
+            <a:schemeClr val="accent1"/>
+          </a:lnRef>
+          <a:fillRef idx="3">
+            <a:schemeClr val="accent1"/>
+          </a:fillRef>
+          <a:effectRef idx="2">
+            <a:schemeClr val="accent1"/>
+          </a:effectRef>
+          <a:fontRef idx="minor">
+            <a:schemeClr val="lt1"/>
+          </a:fontRef>
+        </p:style>
+        <p:txBody>
+          <a:bodyPr rtlCol="0" anchor="ctr"/>
+          <a:lstStyle/>
+          <a:p>
+            <a:pPr algn="ctr"/>
+            <a:endParaRPr lang="pt-BR"/>
+          </a:p>
+        </p:txBody>
+      </p:sp>
+      <p:sp>
+        <p:nvSpPr>
+          <p:cNvPr id="21" name="Retângulo 20"/>
+          <p:cNvSpPr/>
+          <p:nvPr/>
+        </p:nvSpPr>
+        <p:spPr>
+          <a:xfrm>
+            <a:off x="438323" y="975545"/>
+            <a:ext cx="8024075" cy="3789693"/>
+          </a:xfrm>
+          <a:prstGeom prst="rect">
+            <a:avLst/>
+          </a:prstGeom>
+          <a:solidFill>
+            <a:schemeClr val="bg1">
+              <a:lumMod val="95000"/>
+            </a:schemeClr>
+          </a:solidFill>
+          <a:ln w="3175">
+            <a:solidFill>
+              <a:schemeClr val="bg1">
+                <a:lumMod val="85000"/>
+              </a:schemeClr>
+            </a:solidFill>
+          </a:ln>
+          <a:effectLst/>
+        </p:spPr>
+        <p:style>
+          <a:lnRef idx="1">
+            <a:schemeClr val="accent1"/>
+          </a:lnRef>
+          <a:fillRef idx="3">
+            <a:schemeClr val="accent1"/>
+          </a:fillRef>
+          <a:effectRef idx="2">
+            <a:schemeClr val="accent1"/>
+          </a:effectRef>
+          <a:fontRef idx="minor">
+            <a:schemeClr val="lt1"/>
+          </a:fontRef>
+        </p:style>
+        <p:txBody>
+          <a:bodyPr rtlCol="0" anchor="ctr"/>
+          <a:lstStyle/>
+          <a:p>
+            <a:pPr algn="ctr"/>
+            <a:endParaRPr lang="pt-BR"/>
+          </a:p>
+        </p:txBody>
+      </p:sp>
+      <p:grpSp>
+        <p:nvGrpSpPr>
+          <p:cNvPr id="22" name="Grupo 7"/>
+          <p:cNvGrpSpPr/>
+          <p:nvPr/>
+        </p:nvGrpSpPr>
+        <p:grpSpPr>
+          <a:xfrm>
+            <a:off x="5739642" y="1520682"/>
+            <a:ext cx="3000739" cy="2488610"/>
+            <a:chOff x="8959367" y="2243285"/>
+            <a:chExt cx="2952014" cy="2729264"/>
+          </a:xfrm>
+        </p:grpSpPr>
+        <p:sp>
+          <p:nvSpPr>
+            <p:cNvPr id="23" name="Retângulo 22"/>
+            <p:cNvSpPr/>
+            <p:nvPr/>
+          </p:nvSpPr>
+          <p:spPr>
+            <a:xfrm>
+              <a:off x="8959368" y="2243286"/>
+              <a:ext cx="2952013" cy="2729263"/>
+            </a:xfrm>
+            <a:prstGeom prst="rect">
+              <a:avLst/>
+            </a:prstGeom>
+            <a:solidFill>
+              <a:schemeClr val="bg2"/>
+            </a:solidFill>
+            <a:ln>
+              <a:noFill/>
+            </a:ln>
+            <a:effectLst/>
+          </p:spPr>
+          <p:style>
+            <a:lnRef idx="1">
+              <a:schemeClr val="accent1"/>
+            </a:lnRef>
+            <a:fillRef idx="3">
+              <a:schemeClr val="accent1"/>
+            </a:fillRef>
+            <a:effectRef idx="2">
+              <a:schemeClr val="accent1"/>
+            </a:effectRef>
+            <a:fontRef idx="minor">
+              <a:schemeClr val="lt1"/>
+            </a:fontRef>
+          </p:style>
+          <p:txBody>
+            <a:bodyPr rtlCol="0" anchor="ctr"/>
+            <a:lstStyle/>
+            <a:p>
+              <a:pPr algn="ctr"/>
+              <a:endParaRPr lang="pt-BR"/>
+            </a:p>
+          </p:txBody>
+        </p:sp>
+        <p:sp>
+          <p:nvSpPr>
+            <p:cNvPr id="24" name="Retângulo 23"/>
+            <p:cNvSpPr/>
+            <p:nvPr/>
+          </p:nvSpPr>
+          <p:spPr>
+            <a:xfrm>
+              <a:off x="8959367" y="2243285"/>
+              <a:ext cx="2952013" cy="2729263"/>
+            </a:xfrm>
+            <a:prstGeom prst="rect">
+              <a:avLst/>
+            </a:prstGeom>
+            <a:noFill/>
+            <a:ln>
+              <a:solidFill>
+                <a:schemeClr val="bg1">
+                  <a:lumMod val="85000"/>
+                </a:schemeClr>
+              </a:solidFill>
+            </a:ln>
+            <a:effectLst/>
+          </p:spPr>
+          <p:style>
+            <a:lnRef idx="1">
+              <a:schemeClr val="accent1"/>
+            </a:lnRef>
+            <a:fillRef idx="3">
+              <a:schemeClr val="accent1"/>
+            </a:fillRef>
+            <a:effectRef idx="2">
+              <a:schemeClr val="accent1"/>
+            </a:effectRef>
+            <a:fontRef idx="minor">
+              <a:schemeClr val="lt1"/>
+            </a:fontRef>
+          </p:style>
+          <p:txBody>
+            <a:bodyPr rtlCol="0" anchor="ctr"/>
+            <a:lstStyle/>
+            <a:p>
+              <a:pPr algn="ctr"/>
+              <a:endParaRPr lang="pt-BR">
+                <a:ln w="18415" cmpd="sng">
+                  <a:solidFill>
+                    <a:srgbClr val="FFFFFF"/>
+                  </a:solidFill>
+                  <a:prstDash val="solid"/>
+                </a:ln>
+                <a:solidFill>
+                  <a:srgbClr val="FFFFFF"/>
+                </a:solidFill>
+                <a:effectLst>
+                  <a:outerShdw blurRad="50800" dist="38100" dir="16200000" rotWithShape="0">
+                    <a:prstClr val="black">
+                      <a:alpha val="40000"/>
+                    </a:prstClr>
+                  </a:outerShdw>
+                </a:effectLst>
+              </a:endParaRPr>
+            </a:p>
+          </p:txBody>
+        </p:sp>
+      </p:grpSp>
+      <p:sp>
+        <p:nvSpPr>
+          <p:cNvPr id="25" name="Retângulo de cantos arredondados 5"/>
+          <p:cNvSpPr/>
+          <p:nvPr/>
+        </p:nvSpPr>
+        <p:spPr>
+          <a:xfrm flipV="1">
+            <a:off x="447585" y="4765233"/>
+            <a:ext cx="8024075" cy="45719"/>
+          </a:xfrm>
+          <a:prstGeom prst="roundRect">
+            <a:avLst/>
+          </a:prstGeom>
+          <a:solidFill>
+            <a:srgbClr val="4BB7C1"/>
+          </a:solidFill>
+          <a:ln>
+            <a:noFill/>
+          </a:ln>
+          <a:effectLst/>
+        </p:spPr>
+        <p:style>
+          <a:lnRef idx="1">
+            <a:schemeClr val="accent1"/>
+          </a:lnRef>
+          <a:fillRef idx="3">
+            <a:schemeClr val="accent1"/>
+          </a:fillRef>
+          <a:effectRef idx="2">
+            <a:schemeClr val="accent1"/>
+          </a:effectRef>
+          <a:fontRef idx="minor">
+            <a:schemeClr val="lt1"/>
+          </a:fontRef>
+        </p:style>
+        <p:txBody>
+          <a:bodyPr rtlCol="0" anchor="ctr"/>
+          <a:lstStyle/>
+          <a:p>
+            <a:pPr algn="ctr"/>
+            <a:endParaRPr lang="pt-BR"/>
+          </a:p>
+        </p:txBody>
+      </p:sp>
+      <p:sp>
+        <p:nvSpPr>
+          <p:cNvPr id="26" name="CaixaDeTexto 25"/>
+          <p:cNvSpPr txBox="1"/>
+          <p:nvPr/>
+        </p:nvSpPr>
+        <p:spPr>
+          <a:xfrm>
+            <a:off x="692222" y="1113296"/>
+            <a:ext cx="4920716" cy="1277273"/>
+          </a:xfrm>
+          <a:prstGeom prst="rect">
+            <a:avLst/>
+          </a:prstGeom>
+          <a:noFill/>
+        </p:spPr>
+        <p:txBody>
+          <a:bodyPr wrap="square" rtlCol="0">
+            <a:spAutoFit/>
+          </a:bodyPr>
+          <a:lstStyle/>
+          <a:p>
+            <a:r>
+              <a:rPr lang="pt-BR" sz="1400" b="1" dirty="0">
+                <a:solidFill>
+                  <a:srgbClr val="219D93"/>
+                </a:solidFill>
+              </a:rPr>
+              <a:t>Estrutura organizacional</a:t>
+            </a:r>
+          </a:p>
+          <a:p>
+            <a:pPr marL="342900" indent="-342900">
+              <a:lnSpc>
+                <a:spcPct val="150000"/>
+              </a:lnSpc>
+              <a:buFont typeface="+mj-lt"/>
+              <a:buAutoNum type="arabicPeriod" startAt="4"/>
+            </a:pPr>
+            <a:r>
+              <a:rPr lang="pt-BR" sz="1400" b="1" dirty="0">
+                <a:solidFill>
+                  <a:schemeClr val="tx1">
+                    <a:lumMod val="65000"/>
+                    <a:lumOff val="35000"/>
+                  </a:schemeClr>
+                </a:solidFill>
+              </a:rPr>
+              <a:t>Amplitude de controle </a:t>
+            </a:r>
+            <a:r>
+              <a:rPr lang="pt-BR" sz="1400" dirty="0">
+                <a:solidFill>
+                  <a:schemeClr val="tx1">
+                    <a:lumMod val="65000"/>
+                    <a:lumOff val="35000"/>
+                  </a:schemeClr>
+                </a:solidFill>
+              </a:rPr>
+              <a:t>(ROBBINS, 2006)</a:t>
+            </a:r>
+          </a:p>
+          <a:p>
+            <a:r>
+              <a:rPr lang="pt-BR" sz="1400" dirty="0">
+                <a:solidFill>
+                  <a:schemeClr val="tx1">
+                    <a:lumMod val="65000"/>
+                    <a:lumOff val="35000"/>
+                  </a:schemeClr>
+                </a:solidFill>
+              </a:rPr>
+              <a:t>Pergunta a ser respondida:  quantas pessoas cada executivo pode dirigir com eficiência e eficácia?</a:t>
+            </a:r>
+          </a:p>
+          <a:p>
+            <a:endParaRPr lang="pt-BR" sz="1400" dirty="0">
+              <a:solidFill>
+                <a:schemeClr val="tx1">
+                  <a:lumMod val="65000"/>
+                  <a:lumOff val="35000"/>
+                </a:schemeClr>
+              </a:solidFill>
+            </a:endParaRPr>
+          </a:p>
+        </p:txBody>
+      </p:sp>
+      <p:pic>
+        <p:nvPicPr>
+          <p:cNvPr id="14" name="Picture 5"/>
+          <p:cNvPicPr>
+            <a:picLocks noChangeAspect="1" noChangeArrowheads="1"/>
+          </p:cNvPicPr>
+          <p:nvPr/>
+        </p:nvPicPr>
+        <p:blipFill>
+          <a:blip r:embed="rId2">
+            <a:extLst>
+              <a:ext uri="{28A0092B-C50C-407E-A947-70E740481C1C}">
+                <a14:useLocalDpi xmlns:a14="http://schemas.microsoft.com/office/drawing/2010/main" val="0"/>
+              </a:ext>
+            </a:extLst>
+          </a:blip>
+          <a:srcRect/>
+          <a:stretch>
+            <a:fillRect/>
+          </a:stretch>
+        </p:blipFill>
+        <p:spPr bwMode="auto">
+          <a:xfrm>
+            <a:off x="5856089" y="1658629"/>
+            <a:ext cx="2757587" cy="2224054"/>
+          </a:xfrm>
+          <a:prstGeom prst="rect">
+            <a:avLst/>
+          </a:prstGeom>
+          <a:noFill/>
+          <a:ln>
+            <a:noFill/>
+          </a:ln>
+          <a:extLst>
+            <a:ext uri="{909E8E84-426E-40DD-AFC4-6F175D3DCCD1}">
+              <a14:hiddenFill xmlns:a14="http://schemas.microsoft.com/office/drawing/2010/main">
+                <a:solidFill>
+                  <a:schemeClr val="accent1"/>
+                </a:solidFill>
+              </a14:hiddenFill>
+            </a:ext>
+            <a:ext uri="{91240B29-F687-4F45-9708-019B960494DF}">
+              <a14:hiddenLine xmlns:a14="http://schemas.microsoft.com/office/drawing/2010/main" w="9525">
+                <a:solidFill>
+                  <a:schemeClr val="tx1"/>
+                </a:solidFill>
+                <a:miter lim="800000"/>
+                <a:headEnd/>
+                <a:tailEnd/>
+              </a14:hiddenLine>
+            </a:ext>
+          </a:extLst>
+        </p:spPr>
+      </p:pic>
+      <p:sp>
+        <p:nvSpPr>
+          <p:cNvPr id="15" name="CaixaDeTexto 14"/>
+          <p:cNvSpPr txBox="1"/>
+          <p:nvPr/>
+        </p:nvSpPr>
+        <p:spPr>
+          <a:xfrm>
+            <a:off x="369785" y="561729"/>
+            <a:ext cx="5264322" cy="338554"/>
+          </a:xfrm>
+          <a:prstGeom prst="rect">
+            <a:avLst/>
+          </a:prstGeom>
+          <a:noFill/>
+        </p:spPr>
+        <p:txBody>
+          <a:bodyPr wrap="square" rtlCol="0">
+            <a:spAutoFit/>
+          </a:bodyPr>
+          <a:lstStyle/>
+          <a:p>
+            <a:r>
+              <a:rPr lang="pt-BR" sz="1600" b="1" dirty="0">
+                <a:solidFill>
+                  <a:schemeClr val="tx1">
+                    <a:lumMod val="65000"/>
+                    <a:lumOff val="35000"/>
+                  </a:schemeClr>
+                </a:solidFill>
+              </a:rPr>
+              <a:t>Importância da estrutura organizacional da TI</a:t>
+            </a:r>
+          </a:p>
+        </p:txBody>
+      </p:sp>
+      <p:pic>
+        <p:nvPicPr>
+          <p:cNvPr id="4" name="Imagem 3">
+            <a:extLst>
+              <a:ext uri="{FF2B5EF4-FFF2-40B4-BE49-F238E27FC236}">
+                <a16:creationId xmlns:a16="http://schemas.microsoft.com/office/drawing/2014/main" id="{34CE3467-99A3-40A7-9A7A-8C9DE34CBB12}"/>
+              </a:ext>
+            </a:extLst>
+          </p:cNvPr>
+          <p:cNvPicPr>
+            <a:picLocks noChangeAspect="1"/>
+          </p:cNvPicPr>
+          <p:nvPr/>
+        </p:nvPicPr>
+        <p:blipFill>
+          <a:blip r:embed="rId3"/>
+          <a:stretch>
+            <a:fillRect/>
+          </a:stretch>
+        </p:blipFill>
+        <p:spPr>
+          <a:xfrm>
+            <a:off x="587539" y="2161960"/>
+            <a:ext cx="7506785" cy="2476663"/>
+          </a:xfrm>
+          <a:prstGeom prst="rect">
+            <a:avLst/>
+          </a:prstGeom>
+        </p:spPr>
+      </p:pic>
+    </p:spTree>
+    <p:extLst>
+      <p:ext uri="{BB962C8B-B14F-4D97-AF65-F5344CB8AC3E}">
+        <p14:creationId xmlns:p14="http://schemas.microsoft.com/office/powerpoint/2010/main" val="1322505894"/>
+      </p:ext>
+    </p:extLst>
+  </p:cSld>
+  <p:clrMapOvr>
+    <a:masterClrMapping/>
+  </p:clrMapOvr>
+</p:sld>
+</file>
+
+<file path=ppt/slides/slide17.xml><?xml version="1.0" encoding="utf-8"?>
 <p:sld xmlns:a="http://schemas.openxmlformats.org/drawingml/2006/main" xmlns:r="http://schemas.openxmlformats.org/officeDocument/2006/relationships" xmlns:p="http://schemas.openxmlformats.org/presentationml/2006/main">
   <p:cSld>
     <p:spTree>
@@ -7853,7 +7864,7 @@
 </p:sld>
 </file>
 
-<file path=ppt/slides/slide19.xml><?xml version="1.0" encoding="utf-8"?>
+<file path=ppt/slides/slide18.xml><?xml version="1.0" encoding="utf-8"?>
 <p:sld xmlns:a="http://schemas.openxmlformats.org/drawingml/2006/main" xmlns:r="http://schemas.openxmlformats.org/officeDocument/2006/relationships" xmlns:p="http://schemas.openxmlformats.org/presentationml/2006/main">
   <p:cSld>
     <p:spTree>
@@ -8217,7 +8228,7 @@
         <p:spPr>
           <a:xfrm>
             <a:off x="692222" y="1113296"/>
-            <a:ext cx="4920716" cy="1277273"/>
+            <a:ext cx="4920716" cy="3431709"/>
           </a:xfrm>
           <a:prstGeom prst="rect">
             <a:avLst/>
@@ -8292,6 +8303,92 @@
                 </a:schemeClr>
               </a:solidFill>
             </a:endParaRPr>
+          </a:p>
+          <a:p>
+            <a:pPr>
+              <a:spcAft>
+                <a:spcPts val="0"/>
+              </a:spcAft>
+            </a:pPr>
+            <a:r>
+              <a:rPr lang="pt-BR" sz="1400" dirty="0">
+                <a:solidFill>
+                  <a:schemeClr val="tx1">
+                    <a:lumMod val="65000"/>
+                    <a:lumOff val="35000"/>
+                  </a:schemeClr>
+                </a:solidFill>
+              </a:rPr>
+              <a:t>Determina o número de funcionários que um executivo consegue dirigir com eficiência e eficácia.</a:t>
+            </a:r>
+          </a:p>
+          <a:p>
+            <a:pPr marL="285750" indent="-285750">
+              <a:spcAft>
+                <a:spcPts val="0"/>
+              </a:spcAft>
+              <a:buFont typeface="Arial" panose="020B0604020202020204" pitchFamily="34" charset="0"/>
+              <a:buChar char="•"/>
+            </a:pPr>
+            <a:r>
+              <a:rPr lang="pt-BR" sz="1400" dirty="0">
+                <a:solidFill>
+                  <a:schemeClr val="tx1">
+                    <a:lumMod val="65000"/>
+                    <a:lumOff val="35000"/>
+                  </a:schemeClr>
+                </a:solidFill>
+              </a:rPr>
+              <a:t>Influencia o número de níveis de hierarquia que uma empresa terá;</a:t>
+            </a:r>
+          </a:p>
+          <a:p>
+            <a:pPr marL="1655763" lvl="3" indent="-285750">
+              <a:spcAft>
+                <a:spcPts val="0"/>
+              </a:spcAft>
+              <a:buFont typeface="Arial" panose="020B0604020202020204" pitchFamily="34" charset="0"/>
+              <a:buChar char="•"/>
+            </a:pPr>
+            <a:r>
+              <a:rPr lang="pt-BR" sz="1400" b="1" dirty="0">
+                <a:solidFill>
+                  <a:srgbClr val="219D93"/>
+                </a:solidFill>
+              </a:rPr>
+              <a:t>Amplitude maior </a:t>
+            </a:r>
+            <a:r>
+              <a:rPr lang="pt-BR" sz="1400" dirty="0">
+                <a:solidFill>
+                  <a:schemeClr val="tx1">
+                    <a:lumMod val="65000"/>
+                    <a:lumOff val="35000"/>
+                  </a:schemeClr>
+                </a:solidFill>
+              </a:rPr>
+              <a:t>é mais eficiente em termos de custo. Por outro lado, chega um momento que começa a reduzir a eficácia;</a:t>
+            </a:r>
+          </a:p>
+          <a:p>
+            <a:pPr marL="285750" indent="-285750">
+              <a:spcAft>
+                <a:spcPts val="300"/>
+              </a:spcAft>
+              <a:buFont typeface="Arial" panose="020B0604020202020204" pitchFamily="34" charset="0"/>
+              <a:buChar char="•"/>
+            </a:pPr>
+            <a:r>
+              <a:rPr lang="pt-BR" sz="1400" dirty="0">
+                <a:solidFill>
+                  <a:schemeClr val="tx1">
+                    <a:lumMod val="65000"/>
+                    <a:lumOff val="35000"/>
+                  </a:schemeClr>
+                </a:solidFill>
+              </a:rPr>
+              <a:t>Amplitude menor é onerosa, retarda o processo decisório e desestimula os funcionários porque a supervisão passa a ser muito próxima, tendendo à rigidez. </a:t>
+            </a:r>
           </a:p>
         </p:txBody>
       </p:sp>
@@ -8351,6 +8448,57 @@
       </p:pic>
       <p:sp>
         <p:nvSpPr>
+          <p:cNvPr id="2" name="Seta: para a Direita 1"/>
+          <p:cNvSpPr/>
+          <p:nvPr/>
+        </p:nvSpPr>
+        <p:spPr>
+          <a:xfrm>
+            <a:off x="769594" y="3228535"/>
+            <a:ext cx="1312424" cy="562708"/>
+          </a:xfrm>
+          <a:prstGeom prst="rightArrow">
+            <a:avLst>
+              <a:gd name="adj1" fmla="val 70000"/>
+              <a:gd name="adj2" fmla="val 50000"/>
+            </a:avLst>
+          </a:prstGeom>
+          <a:solidFill>
+            <a:srgbClr val="219D93"/>
+          </a:solidFill>
+          <a:ln>
+            <a:noFill/>
+          </a:ln>
+          <a:effectLst/>
+        </p:spPr>
+        <p:style>
+          <a:lnRef idx="1">
+            <a:schemeClr val="accent1"/>
+          </a:lnRef>
+          <a:fillRef idx="3">
+            <a:schemeClr val="accent1"/>
+          </a:fillRef>
+          <a:effectRef idx="2">
+            <a:schemeClr val="accent1"/>
+          </a:effectRef>
+          <a:fontRef idx="minor">
+            <a:schemeClr val="lt1"/>
+          </a:fontRef>
+        </p:style>
+        <p:txBody>
+          <a:bodyPr rtlCol="0" anchor="ctr"/>
+          <a:lstStyle/>
+          <a:p>
+            <a:pPr algn="ctr"/>
+            <a:r>
+              <a:rPr lang="pt-BR" sz="1400" b="1" dirty="0"/>
+              <a:t>TENDÊNCIA</a:t>
+            </a:r>
+          </a:p>
+        </p:txBody>
+      </p:sp>
+      <p:sp>
+        <p:nvSpPr>
           <p:cNvPr id="15" name="CaixaDeTexto 14"/>
           <p:cNvSpPr txBox="1"/>
           <p:nvPr/>
@@ -8385,40 +8533,295 @@
           </a:p>
         </p:txBody>
       </p:sp>
+    </p:spTree>
+    <p:extLst>
+      <p:ext uri="{BB962C8B-B14F-4D97-AF65-F5344CB8AC3E}">
+        <p14:creationId xmlns:p14="http://schemas.microsoft.com/office/powerpoint/2010/main" val="2201542424"/>
+      </p:ext>
+    </p:extLst>
+  </p:cSld>
+  <p:clrMapOvr>
+    <a:masterClrMapping/>
+  </p:clrMapOvr>
+</p:sld>
+</file>
+
+<file path=ppt/slides/slide19.xml><?xml version="1.0" encoding="utf-8"?>
+<p:sld xmlns:a="http://schemas.openxmlformats.org/drawingml/2006/main" xmlns:r="http://schemas.openxmlformats.org/officeDocument/2006/relationships" xmlns:p="http://schemas.openxmlformats.org/presentationml/2006/main">
+  <p:cSld>
+    <p:spTree>
+      <p:nvGrpSpPr>
+        <p:cNvPr id="1" name=""/>
+        <p:cNvGrpSpPr/>
+        <p:nvPr/>
+      </p:nvGrpSpPr>
+      <p:grpSpPr>
+        <a:xfrm>
+          <a:off x="0" y="0"/>
+          <a:ext cx="0" cy="0"/>
+          <a:chOff x="0" y="0"/>
+          <a:chExt cx="0" cy="0"/>
+        </a:xfrm>
+      </p:grpSpPr>
+      <p:sp>
+        <p:nvSpPr>
+          <p:cNvPr id="17" name="CaixaDeTexto 16"/>
+          <p:cNvSpPr txBox="1"/>
+          <p:nvPr/>
+        </p:nvSpPr>
+        <p:spPr>
+          <a:xfrm>
+            <a:off x="2571624" y="-16026"/>
+            <a:ext cx="5264322" cy="338554"/>
+          </a:xfrm>
+          <a:prstGeom prst="rect">
+            <a:avLst/>
+          </a:prstGeom>
+          <a:noFill/>
+        </p:spPr>
+        <p:txBody>
+          <a:bodyPr wrap="square" rtlCol="0">
+            <a:spAutoFit/>
+          </a:bodyPr>
+          <a:lstStyle/>
+          <a:p>
+            <a:r>
+              <a:rPr lang="pt-BR" sz="1600" b="1" dirty="0">
+                <a:solidFill>
+                  <a:schemeClr val="tx1">
+                    <a:lumMod val="65000"/>
+                    <a:lumOff val="35000"/>
+                  </a:schemeClr>
+                </a:solidFill>
+              </a:rPr>
+              <a:t>Importância da estrutura organizacional da TI</a:t>
+            </a:r>
+          </a:p>
+        </p:txBody>
+      </p:sp>
       <p:pic>
         <p:nvPicPr>
-          <p:cNvPr id="4" name="Imagem 3">
+          <p:cNvPr id="4" name="Picture 5">
             <a:extLst>
               <a:ext uri="{FF2B5EF4-FFF2-40B4-BE49-F238E27FC236}">
-                <a16:creationId xmlns:a16="http://schemas.microsoft.com/office/drawing/2014/main" id="{34CE3467-99A3-40A7-9A7A-8C9DE34CBB12}"/>
+                <a16:creationId xmlns:a16="http://schemas.microsoft.com/office/drawing/2014/main" id="{30D8F874-48A8-4C91-9D68-F2D9C00E2A15}"/>
               </a:ext>
             </a:extLst>
           </p:cNvPr>
           <p:cNvPicPr>
-            <a:picLocks noChangeAspect="1"/>
+            <a:picLocks noChangeAspect="1" noChangeArrowheads="1"/>
           </p:cNvPicPr>
           <p:nvPr/>
         </p:nvPicPr>
         <p:blipFill>
-          <a:blip r:embed="rId3"/>
+          <a:blip r:embed="rId2">
+            <a:extLst>
+              <a:ext uri="{28A0092B-C50C-407E-A947-70E740481C1C}">
+                <a14:useLocalDpi xmlns:a14="http://schemas.microsoft.com/office/drawing/2010/main" val="0"/>
+              </a:ext>
+            </a:extLst>
+          </a:blip>
+          <a:srcRect/>
           <a:stretch>
             <a:fillRect/>
           </a:stretch>
         </p:blipFill>
+        <p:spPr bwMode="auto">
+          <a:xfrm>
+            <a:off x="2261848" y="268835"/>
+            <a:ext cx="5872217" cy="4700376"/>
+          </a:xfrm>
+          <a:prstGeom prst="rect">
+            <a:avLst/>
+          </a:prstGeom>
+          <a:noFill/>
+          <a:ln>
+            <a:noFill/>
+          </a:ln>
+          <a:extLst>
+            <a:ext uri="{909E8E84-426E-40DD-AFC4-6F175D3DCCD1}">
+              <a14:hiddenFill xmlns:a14="http://schemas.microsoft.com/office/drawing/2010/main">
+                <a:solidFill>
+                  <a:schemeClr val="accent1"/>
+                </a:solidFill>
+              </a14:hiddenFill>
+            </a:ext>
+            <a:ext uri="{91240B29-F687-4F45-9708-019B960494DF}">
+              <a14:hiddenLine xmlns:a14="http://schemas.microsoft.com/office/drawing/2010/main" w="9525">
+                <a:solidFill>
+                  <a:schemeClr val="tx1"/>
+                </a:solidFill>
+                <a:miter lim="800000"/>
+                <a:headEnd/>
+                <a:tailEnd/>
+              </a14:hiddenLine>
+            </a:ext>
+          </a:extLst>
+        </p:spPr>
+      </p:pic>
+      <p:sp>
+        <p:nvSpPr>
+          <p:cNvPr id="5" name="Retângulo 4">
+            <a:extLst>
+              <a:ext uri="{FF2B5EF4-FFF2-40B4-BE49-F238E27FC236}">
+                <a16:creationId xmlns:a16="http://schemas.microsoft.com/office/drawing/2014/main" id="{AFC855F2-A8BC-420B-B2FB-6C4567B25F2C}"/>
+              </a:ext>
+            </a:extLst>
+          </p:cNvPr>
+          <p:cNvSpPr/>
+          <p:nvPr/>
+        </p:nvSpPr>
         <p:spPr>
           <a:xfrm>
-            <a:off x="587539" y="2161960"/>
-            <a:ext cx="7506785" cy="2476663"/>
+            <a:off x="64513" y="1177591"/>
+            <a:ext cx="2199565" cy="3077766"/>
           </a:xfrm>
           <a:prstGeom prst="rect">
             <a:avLst/>
           </a:prstGeom>
         </p:spPr>
-      </p:pic>
+        <p:style>
+          <a:lnRef idx="0">
+            <a:schemeClr val="accent3"/>
+          </a:lnRef>
+          <a:fillRef idx="3">
+            <a:schemeClr val="accent3"/>
+          </a:fillRef>
+          <a:effectRef idx="3">
+            <a:schemeClr val="accent3"/>
+          </a:effectRef>
+          <a:fontRef idx="minor">
+            <a:schemeClr val="lt1"/>
+          </a:fontRef>
+        </p:style>
+        <p:txBody>
+          <a:bodyPr wrap="square">
+            <a:spAutoFit/>
+          </a:bodyPr>
+          <a:lstStyle/>
+          <a:p>
+            <a:pPr>
+              <a:spcAft>
+                <a:spcPts val="1200"/>
+              </a:spcAft>
+              <a:buFont typeface="+mj-lt"/>
+              <a:buAutoNum type="arabicPeriod"/>
+            </a:pPr>
+            <a:r>
+              <a:rPr lang="pt-BR" sz="1600" b="1" dirty="0">
+                <a:solidFill>
+                  <a:schemeClr val="tx1">
+                    <a:lumMod val="65000"/>
+                    <a:lumOff val="35000"/>
+                  </a:schemeClr>
+                </a:solidFill>
+              </a:rPr>
+              <a:t>Especialização do trabalho</a:t>
+            </a:r>
+          </a:p>
+          <a:p>
+            <a:pPr>
+              <a:spcAft>
+                <a:spcPts val="1200"/>
+              </a:spcAft>
+              <a:buFont typeface="+mj-lt"/>
+              <a:buAutoNum type="arabicPeriod"/>
+            </a:pPr>
+            <a:r>
+              <a:rPr lang="pt-BR" sz="1600" b="1" dirty="0">
+                <a:solidFill>
+                  <a:schemeClr val="tx1">
+                    <a:lumMod val="65000"/>
+                    <a:lumOff val="35000"/>
+                  </a:schemeClr>
+                </a:solidFill>
+              </a:rPr>
+              <a:t>Departamentalização</a:t>
+            </a:r>
+          </a:p>
+          <a:p>
+            <a:pPr>
+              <a:spcAft>
+                <a:spcPts val="1200"/>
+              </a:spcAft>
+              <a:buFont typeface="+mj-lt"/>
+              <a:buAutoNum type="arabicPeriod"/>
+            </a:pPr>
+            <a:r>
+              <a:rPr lang="pt-BR" sz="1600" b="1" dirty="0">
+                <a:solidFill>
+                  <a:schemeClr val="tx1">
+                    <a:lumMod val="65000"/>
+                    <a:lumOff val="35000"/>
+                  </a:schemeClr>
+                </a:solidFill>
+              </a:rPr>
+              <a:t>Cadeia de comando</a:t>
+            </a:r>
+          </a:p>
+          <a:p>
+            <a:pPr>
+              <a:spcAft>
+                <a:spcPts val="1200"/>
+              </a:spcAft>
+              <a:buFont typeface="+mj-lt"/>
+              <a:buAutoNum type="arabicPeriod"/>
+            </a:pPr>
+            <a:r>
+              <a:rPr lang="pt-BR" sz="1600" b="1" dirty="0">
+                <a:solidFill>
+                  <a:schemeClr val="tx1">
+                    <a:lumMod val="65000"/>
+                    <a:lumOff val="35000"/>
+                  </a:schemeClr>
+                </a:solidFill>
+              </a:rPr>
+              <a:t>Amplitude de controle</a:t>
+            </a:r>
+          </a:p>
+          <a:p>
+            <a:pPr>
+              <a:spcAft>
+                <a:spcPts val="1200"/>
+              </a:spcAft>
+              <a:buFont typeface="+mj-lt"/>
+              <a:buAutoNum type="arabicPeriod"/>
+            </a:pPr>
+            <a:r>
+              <a:rPr lang="pt-BR" sz="1600" b="1" dirty="0">
+                <a:solidFill>
+                  <a:srgbClr val="0066FF"/>
+                </a:solidFill>
+              </a:rPr>
+              <a:t>Centralização e descentralização</a:t>
+            </a:r>
+          </a:p>
+          <a:p>
+            <a:pPr>
+              <a:spcAft>
+                <a:spcPts val="1200"/>
+              </a:spcAft>
+              <a:buFont typeface="+mj-lt"/>
+              <a:buAutoNum type="arabicPeriod"/>
+            </a:pPr>
+            <a:r>
+              <a:rPr lang="pt-BR" sz="1600" b="1" dirty="0">
+                <a:solidFill>
+                  <a:schemeClr val="tx1">
+                    <a:lumMod val="65000"/>
+                    <a:lumOff val="35000"/>
+                  </a:schemeClr>
+                </a:solidFill>
+              </a:rPr>
+              <a:t>Formalização</a:t>
+            </a:r>
+          </a:p>
+        </p:txBody>
+      </p:sp>
     </p:spTree>
     <p:extLst>
       <p:ext uri="{BB962C8B-B14F-4D97-AF65-F5344CB8AC3E}">
-        <p14:creationId xmlns:p14="http://schemas.microsoft.com/office/powerpoint/2010/main" val="1322505894"/>
+        <p14:creationId xmlns:p14="http://schemas.microsoft.com/office/powerpoint/2010/main" val="2661064859"/>
       </p:ext>
     </p:extLst>
   </p:cSld>
@@ -8576,688 +8979,6 @@
 </file>
 
 <file path=ppt/slides/slide20.xml><?xml version="1.0" encoding="utf-8"?>
-<p:sld xmlns:a="http://schemas.openxmlformats.org/drawingml/2006/main" xmlns:r="http://schemas.openxmlformats.org/officeDocument/2006/relationships" xmlns:p="http://schemas.openxmlformats.org/presentationml/2006/main">
-  <p:cSld>
-    <p:spTree>
-      <p:nvGrpSpPr>
-        <p:cNvPr id="1" name=""/>
-        <p:cNvGrpSpPr/>
-        <p:nvPr/>
-      </p:nvGrpSpPr>
-      <p:grpSpPr>
-        <a:xfrm>
-          <a:off x="0" y="0"/>
-          <a:ext cx="0" cy="0"/>
-          <a:chOff x="0" y="0"/>
-          <a:chExt cx="0" cy="0"/>
-        </a:xfrm>
-      </p:grpSpPr>
-      <p:sp>
-        <p:nvSpPr>
-          <p:cNvPr id="20" name="Retângulo 10"/>
-          <p:cNvSpPr/>
-          <p:nvPr/>
-        </p:nvSpPr>
-        <p:spPr>
-          <a:xfrm rot="275902">
-            <a:off x="8117877" y="1387678"/>
-            <a:ext cx="626363" cy="541902"/>
-          </a:xfrm>
-          <a:custGeom>
-            <a:avLst/>
-            <a:gdLst>
-              <a:gd name="connsiteX0" fmla="*/ 0 w 556537"/>
-              <a:gd name="connsiteY0" fmla="*/ 0 h 349397"/>
-              <a:gd name="connsiteX1" fmla="*/ 556537 w 556537"/>
-              <a:gd name="connsiteY1" fmla="*/ 0 h 349397"/>
-              <a:gd name="connsiteX2" fmla="*/ 556537 w 556537"/>
-              <a:gd name="connsiteY2" fmla="*/ 349397 h 349397"/>
-              <a:gd name="connsiteX3" fmla="*/ 0 w 556537"/>
-              <a:gd name="connsiteY3" fmla="*/ 349397 h 349397"/>
-              <a:gd name="connsiteX4" fmla="*/ 0 w 556537"/>
-              <a:gd name="connsiteY4" fmla="*/ 0 h 349397"/>
-              <a:gd name="connsiteX0" fmla="*/ 0 w 568569"/>
-              <a:gd name="connsiteY0" fmla="*/ 0 h 541902"/>
-              <a:gd name="connsiteX1" fmla="*/ 556537 w 568569"/>
-              <a:gd name="connsiteY1" fmla="*/ 0 h 541902"/>
-              <a:gd name="connsiteX2" fmla="*/ 568569 w 568569"/>
-              <a:gd name="connsiteY2" fmla="*/ 541902 h 541902"/>
-              <a:gd name="connsiteX3" fmla="*/ 0 w 568569"/>
-              <a:gd name="connsiteY3" fmla="*/ 349397 h 541902"/>
-              <a:gd name="connsiteX4" fmla="*/ 0 w 568569"/>
-              <a:gd name="connsiteY4" fmla="*/ 0 h 541902"/>
-              <a:gd name="connsiteX0" fmla="*/ 0 w 568569"/>
-              <a:gd name="connsiteY0" fmla="*/ 0 h 541902"/>
-              <a:gd name="connsiteX1" fmla="*/ 556537 w 568569"/>
-              <a:gd name="connsiteY1" fmla="*/ 108284 h 541902"/>
-              <a:gd name="connsiteX2" fmla="*/ 568569 w 568569"/>
-              <a:gd name="connsiteY2" fmla="*/ 541902 h 541902"/>
-              <a:gd name="connsiteX3" fmla="*/ 0 w 568569"/>
-              <a:gd name="connsiteY3" fmla="*/ 349397 h 541902"/>
-              <a:gd name="connsiteX4" fmla="*/ 0 w 568569"/>
-              <a:gd name="connsiteY4" fmla="*/ 0 h 541902"/>
-            </a:gdLst>
-            <a:ahLst/>
-            <a:cxnLst>
-              <a:cxn ang="0">
-                <a:pos x="connsiteX0" y="connsiteY0"/>
-              </a:cxn>
-              <a:cxn ang="0">
-                <a:pos x="connsiteX1" y="connsiteY1"/>
-              </a:cxn>
-              <a:cxn ang="0">
-                <a:pos x="connsiteX2" y="connsiteY2"/>
-              </a:cxn>
-              <a:cxn ang="0">
-                <a:pos x="connsiteX3" y="connsiteY3"/>
-              </a:cxn>
-              <a:cxn ang="0">
-                <a:pos x="connsiteX4" y="connsiteY4"/>
-              </a:cxn>
-            </a:cxnLst>
-            <a:rect l="l" t="t" r="r" b="b"/>
-            <a:pathLst>
-              <a:path w="568569" h="541902">
-                <a:moveTo>
-                  <a:pt x="0" y="0"/>
-                </a:moveTo>
-                <a:lnTo>
-                  <a:pt x="556537" y="108284"/>
-                </a:lnTo>
-                <a:lnTo>
-                  <a:pt x="568569" y="541902"/>
-                </a:lnTo>
-                <a:lnTo>
-                  <a:pt x="0" y="349397"/>
-                </a:lnTo>
-                <a:lnTo>
-                  <a:pt x="0" y="0"/>
-                </a:lnTo>
-                <a:close/>
-              </a:path>
-            </a:pathLst>
-          </a:custGeom>
-          <a:solidFill>
-            <a:schemeClr val="bg1">
-              <a:lumMod val="75000"/>
-            </a:schemeClr>
-          </a:solidFill>
-          <a:ln>
-            <a:noFill/>
-          </a:ln>
-          <a:effectLst/>
-        </p:spPr>
-        <p:style>
-          <a:lnRef idx="1">
-            <a:schemeClr val="accent1"/>
-          </a:lnRef>
-          <a:fillRef idx="3">
-            <a:schemeClr val="accent1"/>
-          </a:fillRef>
-          <a:effectRef idx="2">
-            <a:schemeClr val="accent1"/>
-          </a:effectRef>
-          <a:fontRef idx="minor">
-            <a:schemeClr val="lt1"/>
-          </a:fontRef>
-        </p:style>
-        <p:txBody>
-          <a:bodyPr rtlCol="0" anchor="ctr"/>
-          <a:lstStyle/>
-          <a:p>
-            <a:pPr algn="ctr"/>
-            <a:endParaRPr lang="pt-BR"/>
-          </a:p>
-        </p:txBody>
-      </p:sp>
-      <p:sp>
-        <p:nvSpPr>
-          <p:cNvPr id="21" name="Retângulo 20"/>
-          <p:cNvSpPr/>
-          <p:nvPr/>
-        </p:nvSpPr>
-        <p:spPr>
-          <a:xfrm>
-            <a:off x="438323" y="975545"/>
-            <a:ext cx="8024075" cy="3789693"/>
-          </a:xfrm>
-          <a:prstGeom prst="rect">
-            <a:avLst/>
-          </a:prstGeom>
-          <a:solidFill>
-            <a:schemeClr val="bg1">
-              <a:lumMod val="95000"/>
-            </a:schemeClr>
-          </a:solidFill>
-          <a:ln w="3175">
-            <a:solidFill>
-              <a:schemeClr val="bg1">
-                <a:lumMod val="85000"/>
-              </a:schemeClr>
-            </a:solidFill>
-          </a:ln>
-          <a:effectLst/>
-        </p:spPr>
-        <p:style>
-          <a:lnRef idx="1">
-            <a:schemeClr val="accent1"/>
-          </a:lnRef>
-          <a:fillRef idx="3">
-            <a:schemeClr val="accent1"/>
-          </a:fillRef>
-          <a:effectRef idx="2">
-            <a:schemeClr val="accent1"/>
-          </a:effectRef>
-          <a:fontRef idx="minor">
-            <a:schemeClr val="lt1"/>
-          </a:fontRef>
-        </p:style>
-        <p:txBody>
-          <a:bodyPr rtlCol="0" anchor="ctr"/>
-          <a:lstStyle/>
-          <a:p>
-            <a:pPr algn="ctr"/>
-            <a:endParaRPr lang="pt-BR"/>
-          </a:p>
-        </p:txBody>
-      </p:sp>
-      <p:grpSp>
-        <p:nvGrpSpPr>
-          <p:cNvPr id="22" name="Grupo 7"/>
-          <p:cNvGrpSpPr/>
-          <p:nvPr/>
-        </p:nvGrpSpPr>
-        <p:grpSpPr>
-          <a:xfrm>
-            <a:off x="5739642" y="1520682"/>
-            <a:ext cx="3000739" cy="2488610"/>
-            <a:chOff x="8959367" y="2243285"/>
-            <a:chExt cx="2952014" cy="2729264"/>
-          </a:xfrm>
-        </p:grpSpPr>
-        <p:sp>
-          <p:nvSpPr>
-            <p:cNvPr id="23" name="Retângulo 22"/>
-            <p:cNvSpPr/>
-            <p:nvPr/>
-          </p:nvSpPr>
-          <p:spPr>
-            <a:xfrm>
-              <a:off x="8959368" y="2243286"/>
-              <a:ext cx="2952013" cy="2729263"/>
-            </a:xfrm>
-            <a:prstGeom prst="rect">
-              <a:avLst/>
-            </a:prstGeom>
-            <a:solidFill>
-              <a:schemeClr val="bg2"/>
-            </a:solidFill>
-            <a:ln>
-              <a:noFill/>
-            </a:ln>
-            <a:effectLst/>
-          </p:spPr>
-          <p:style>
-            <a:lnRef idx="1">
-              <a:schemeClr val="accent1"/>
-            </a:lnRef>
-            <a:fillRef idx="3">
-              <a:schemeClr val="accent1"/>
-            </a:fillRef>
-            <a:effectRef idx="2">
-              <a:schemeClr val="accent1"/>
-            </a:effectRef>
-            <a:fontRef idx="minor">
-              <a:schemeClr val="lt1"/>
-            </a:fontRef>
-          </p:style>
-          <p:txBody>
-            <a:bodyPr rtlCol="0" anchor="ctr"/>
-            <a:lstStyle/>
-            <a:p>
-              <a:pPr algn="ctr"/>
-              <a:endParaRPr lang="pt-BR"/>
-            </a:p>
-          </p:txBody>
-        </p:sp>
-        <p:sp>
-          <p:nvSpPr>
-            <p:cNvPr id="24" name="Retângulo 23"/>
-            <p:cNvSpPr/>
-            <p:nvPr/>
-          </p:nvSpPr>
-          <p:spPr>
-            <a:xfrm>
-              <a:off x="8959367" y="2243285"/>
-              <a:ext cx="2952013" cy="2729263"/>
-            </a:xfrm>
-            <a:prstGeom prst="rect">
-              <a:avLst/>
-            </a:prstGeom>
-            <a:noFill/>
-            <a:ln>
-              <a:solidFill>
-                <a:schemeClr val="bg1">
-                  <a:lumMod val="85000"/>
-                </a:schemeClr>
-              </a:solidFill>
-            </a:ln>
-            <a:effectLst/>
-          </p:spPr>
-          <p:style>
-            <a:lnRef idx="1">
-              <a:schemeClr val="accent1"/>
-            </a:lnRef>
-            <a:fillRef idx="3">
-              <a:schemeClr val="accent1"/>
-            </a:fillRef>
-            <a:effectRef idx="2">
-              <a:schemeClr val="accent1"/>
-            </a:effectRef>
-            <a:fontRef idx="minor">
-              <a:schemeClr val="lt1"/>
-            </a:fontRef>
-          </p:style>
-          <p:txBody>
-            <a:bodyPr rtlCol="0" anchor="ctr"/>
-            <a:lstStyle/>
-            <a:p>
-              <a:pPr algn="ctr"/>
-              <a:endParaRPr lang="pt-BR">
-                <a:ln w="18415" cmpd="sng">
-                  <a:solidFill>
-                    <a:srgbClr val="FFFFFF"/>
-                  </a:solidFill>
-                  <a:prstDash val="solid"/>
-                </a:ln>
-                <a:solidFill>
-                  <a:srgbClr val="FFFFFF"/>
-                </a:solidFill>
-                <a:effectLst>
-                  <a:outerShdw blurRad="50800" dist="38100" dir="16200000" rotWithShape="0">
-                    <a:prstClr val="black">
-                      <a:alpha val="40000"/>
-                    </a:prstClr>
-                  </a:outerShdw>
-                </a:effectLst>
-              </a:endParaRPr>
-            </a:p>
-          </p:txBody>
-        </p:sp>
-      </p:grpSp>
-      <p:sp>
-        <p:nvSpPr>
-          <p:cNvPr id="25" name="Retângulo de cantos arredondados 5"/>
-          <p:cNvSpPr/>
-          <p:nvPr/>
-        </p:nvSpPr>
-        <p:spPr>
-          <a:xfrm flipV="1">
-            <a:off x="447585" y="4765233"/>
-            <a:ext cx="8024075" cy="45719"/>
-          </a:xfrm>
-          <a:prstGeom prst="roundRect">
-            <a:avLst/>
-          </a:prstGeom>
-          <a:solidFill>
-            <a:srgbClr val="4BB7C1"/>
-          </a:solidFill>
-          <a:ln>
-            <a:noFill/>
-          </a:ln>
-          <a:effectLst/>
-        </p:spPr>
-        <p:style>
-          <a:lnRef idx="1">
-            <a:schemeClr val="accent1"/>
-          </a:lnRef>
-          <a:fillRef idx="3">
-            <a:schemeClr val="accent1"/>
-          </a:fillRef>
-          <a:effectRef idx="2">
-            <a:schemeClr val="accent1"/>
-          </a:effectRef>
-          <a:fontRef idx="minor">
-            <a:schemeClr val="lt1"/>
-          </a:fontRef>
-        </p:style>
-        <p:txBody>
-          <a:bodyPr rtlCol="0" anchor="ctr"/>
-          <a:lstStyle/>
-          <a:p>
-            <a:pPr algn="ctr"/>
-            <a:endParaRPr lang="pt-BR"/>
-          </a:p>
-        </p:txBody>
-      </p:sp>
-      <p:sp>
-        <p:nvSpPr>
-          <p:cNvPr id="26" name="CaixaDeTexto 25"/>
-          <p:cNvSpPr txBox="1"/>
-          <p:nvPr/>
-        </p:nvSpPr>
-        <p:spPr>
-          <a:xfrm>
-            <a:off x="692222" y="1113296"/>
-            <a:ext cx="4920716" cy="3431709"/>
-          </a:xfrm>
-          <a:prstGeom prst="rect">
-            <a:avLst/>
-          </a:prstGeom>
-          <a:noFill/>
-        </p:spPr>
-        <p:txBody>
-          <a:bodyPr wrap="square" rtlCol="0">
-            <a:spAutoFit/>
-          </a:bodyPr>
-          <a:lstStyle/>
-          <a:p>
-            <a:r>
-              <a:rPr lang="pt-BR" sz="1400" b="1" dirty="0">
-                <a:solidFill>
-                  <a:srgbClr val="219D93"/>
-                </a:solidFill>
-              </a:rPr>
-              <a:t>Estrutura organizacional</a:t>
-            </a:r>
-          </a:p>
-          <a:p>
-            <a:pPr marL="342900" indent="-342900">
-              <a:lnSpc>
-                <a:spcPct val="150000"/>
-              </a:lnSpc>
-              <a:buFont typeface="+mj-lt"/>
-              <a:buAutoNum type="arabicPeriod" startAt="4"/>
-            </a:pPr>
-            <a:r>
-              <a:rPr lang="pt-BR" sz="1400" b="1" dirty="0">
-                <a:solidFill>
-                  <a:schemeClr val="tx1">
-                    <a:lumMod val="65000"/>
-                    <a:lumOff val="35000"/>
-                  </a:schemeClr>
-                </a:solidFill>
-              </a:rPr>
-              <a:t>Amplitude de controle </a:t>
-            </a:r>
-            <a:r>
-              <a:rPr lang="pt-BR" sz="1400" dirty="0">
-                <a:solidFill>
-                  <a:schemeClr val="tx1">
-                    <a:lumMod val="65000"/>
-                    <a:lumOff val="35000"/>
-                  </a:schemeClr>
-                </a:solidFill>
-              </a:rPr>
-              <a:t>(ROBBINS, 2006)</a:t>
-            </a:r>
-          </a:p>
-          <a:p>
-            <a:r>
-              <a:rPr lang="pt-BR" sz="1400" dirty="0">
-                <a:solidFill>
-                  <a:schemeClr val="tx1">
-                    <a:lumMod val="65000"/>
-                    <a:lumOff val="35000"/>
-                  </a:schemeClr>
-                </a:solidFill>
-              </a:rPr>
-              <a:t>Pergunta a ser respondida:  quantas pessoas cada executivo pode dirigir com eficiência e eficácia?</a:t>
-            </a:r>
-          </a:p>
-          <a:p>
-            <a:endParaRPr lang="pt-BR" sz="1400" dirty="0">
-              <a:solidFill>
-                <a:schemeClr val="tx1">
-                  <a:lumMod val="65000"/>
-                  <a:lumOff val="35000"/>
-                </a:schemeClr>
-              </a:solidFill>
-            </a:endParaRPr>
-          </a:p>
-          <a:p>
-            <a:pPr>
-              <a:spcAft>
-                <a:spcPts val="0"/>
-              </a:spcAft>
-            </a:pPr>
-            <a:r>
-              <a:rPr lang="pt-BR" sz="1400" dirty="0">
-                <a:solidFill>
-                  <a:schemeClr val="tx1">
-                    <a:lumMod val="65000"/>
-                    <a:lumOff val="35000"/>
-                  </a:schemeClr>
-                </a:solidFill>
-              </a:rPr>
-              <a:t>Determina o número de funcionários que um executivo consegue dirigir com eficiência e eficácia.</a:t>
-            </a:r>
-          </a:p>
-          <a:p>
-            <a:pPr marL="285750" indent="-285750">
-              <a:spcAft>
-                <a:spcPts val="0"/>
-              </a:spcAft>
-              <a:buFont typeface="Arial" panose="020B0604020202020204" pitchFamily="34" charset="0"/>
-              <a:buChar char="•"/>
-            </a:pPr>
-            <a:r>
-              <a:rPr lang="pt-BR" sz="1400" dirty="0">
-                <a:solidFill>
-                  <a:schemeClr val="tx1">
-                    <a:lumMod val="65000"/>
-                    <a:lumOff val="35000"/>
-                  </a:schemeClr>
-                </a:solidFill>
-              </a:rPr>
-              <a:t>Influencia o número de níveis de hierarquia que uma empresa terá;</a:t>
-            </a:r>
-          </a:p>
-          <a:p>
-            <a:pPr marL="1655763" lvl="3" indent="-285750">
-              <a:spcAft>
-                <a:spcPts val="0"/>
-              </a:spcAft>
-              <a:buFont typeface="Arial" panose="020B0604020202020204" pitchFamily="34" charset="0"/>
-              <a:buChar char="•"/>
-            </a:pPr>
-            <a:r>
-              <a:rPr lang="pt-BR" sz="1400" b="1" dirty="0">
-                <a:solidFill>
-                  <a:srgbClr val="219D93"/>
-                </a:solidFill>
-              </a:rPr>
-              <a:t>Amplitude maior </a:t>
-            </a:r>
-            <a:r>
-              <a:rPr lang="pt-BR" sz="1400" dirty="0">
-                <a:solidFill>
-                  <a:schemeClr val="tx1">
-                    <a:lumMod val="65000"/>
-                    <a:lumOff val="35000"/>
-                  </a:schemeClr>
-                </a:solidFill>
-              </a:rPr>
-              <a:t>é mais eficiente em termos de custo. Por outro lado, chega um momento que começa a reduzir a eficácia;</a:t>
-            </a:r>
-          </a:p>
-          <a:p>
-            <a:pPr marL="285750" indent="-285750">
-              <a:spcAft>
-                <a:spcPts val="300"/>
-              </a:spcAft>
-              <a:buFont typeface="Arial" panose="020B0604020202020204" pitchFamily="34" charset="0"/>
-              <a:buChar char="•"/>
-            </a:pPr>
-            <a:r>
-              <a:rPr lang="pt-BR" sz="1400" dirty="0">
-                <a:solidFill>
-                  <a:schemeClr val="tx1">
-                    <a:lumMod val="65000"/>
-                    <a:lumOff val="35000"/>
-                  </a:schemeClr>
-                </a:solidFill>
-              </a:rPr>
-              <a:t>Amplitude menor é onerosa, retarda o processo decisório e desestimula os funcionários porque a supervisão passa a ser muito próxima, tendendo à rigidez. </a:t>
-            </a:r>
-          </a:p>
-        </p:txBody>
-      </p:sp>
-      <p:pic>
-        <p:nvPicPr>
-          <p:cNvPr id="14" name="Picture 5"/>
-          <p:cNvPicPr>
-            <a:picLocks noChangeAspect="1" noChangeArrowheads="1"/>
-          </p:cNvPicPr>
-          <p:nvPr/>
-        </p:nvPicPr>
-        <p:blipFill>
-          <a:blip r:embed="rId2">
-            <a:extLst>
-              <a:ext uri="{28A0092B-C50C-407E-A947-70E740481C1C}">
-                <a14:useLocalDpi xmlns:a14="http://schemas.microsoft.com/office/drawing/2010/main" val="0"/>
-              </a:ext>
-            </a:extLst>
-          </a:blip>
-          <a:srcRect/>
-          <a:stretch>
-            <a:fillRect/>
-          </a:stretch>
-        </p:blipFill>
-        <p:spPr bwMode="auto">
-          <a:xfrm>
-            <a:off x="5856089" y="1658629"/>
-            <a:ext cx="2757587" cy="2224054"/>
-          </a:xfrm>
-          <a:prstGeom prst="rect">
-            <a:avLst/>
-          </a:prstGeom>
-          <a:noFill/>
-          <a:ln>
-            <a:noFill/>
-          </a:ln>
-          <a:extLst>
-            <a:ext uri="{909E8E84-426E-40DD-AFC4-6F175D3DCCD1}">
-              <a14:hiddenFill xmlns:a14="http://schemas.microsoft.com/office/drawing/2010/main">
-                <a:solidFill>
-                  <a:schemeClr val="accent1"/>
-                </a:solidFill>
-              </a14:hiddenFill>
-            </a:ext>
-            <a:ext uri="{91240B29-F687-4F45-9708-019B960494DF}">
-              <a14:hiddenLine xmlns:a14="http://schemas.microsoft.com/office/drawing/2010/main" w="9525">
-                <a:solidFill>
-                  <a:schemeClr val="tx1"/>
-                </a:solidFill>
-                <a:miter lim="800000"/>
-                <a:headEnd/>
-                <a:tailEnd/>
-              </a14:hiddenLine>
-            </a:ext>
-          </a:extLst>
-        </p:spPr>
-      </p:pic>
-      <p:sp>
-        <p:nvSpPr>
-          <p:cNvPr id="2" name="Seta: para a Direita 1"/>
-          <p:cNvSpPr/>
-          <p:nvPr/>
-        </p:nvSpPr>
-        <p:spPr>
-          <a:xfrm>
-            <a:off x="769594" y="3228535"/>
-            <a:ext cx="1312424" cy="562708"/>
-          </a:xfrm>
-          <a:prstGeom prst="rightArrow">
-            <a:avLst>
-              <a:gd name="adj1" fmla="val 70000"/>
-              <a:gd name="adj2" fmla="val 50000"/>
-            </a:avLst>
-          </a:prstGeom>
-          <a:solidFill>
-            <a:srgbClr val="219D93"/>
-          </a:solidFill>
-          <a:ln>
-            <a:noFill/>
-          </a:ln>
-          <a:effectLst/>
-        </p:spPr>
-        <p:style>
-          <a:lnRef idx="1">
-            <a:schemeClr val="accent1"/>
-          </a:lnRef>
-          <a:fillRef idx="3">
-            <a:schemeClr val="accent1"/>
-          </a:fillRef>
-          <a:effectRef idx="2">
-            <a:schemeClr val="accent1"/>
-          </a:effectRef>
-          <a:fontRef idx="minor">
-            <a:schemeClr val="lt1"/>
-          </a:fontRef>
-        </p:style>
-        <p:txBody>
-          <a:bodyPr rtlCol="0" anchor="ctr"/>
-          <a:lstStyle/>
-          <a:p>
-            <a:pPr algn="ctr"/>
-            <a:r>
-              <a:rPr lang="pt-BR" sz="1400" b="1" dirty="0"/>
-              <a:t>TENDÊNCIA</a:t>
-            </a:r>
-          </a:p>
-        </p:txBody>
-      </p:sp>
-      <p:sp>
-        <p:nvSpPr>
-          <p:cNvPr id="15" name="CaixaDeTexto 14"/>
-          <p:cNvSpPr txBox="1"/>
-          <p:nvPr/>
-        </p:nvSpPr>
-        <p:spPr>
-          <a:xfrm>
-            <a:off x="369785" y="561729"/>
-            <a:ext cx="5264322" cy="338554"/>
-          </a:xfrm>
-          <a:prstGeom prst="rect">
-            <a:avLst/>
-          </a:prstGeom>
-          <a:noFill/>
-        </p:spPr>
-        <p:txBody>
-          <a:bodyPr wrap="square" rtlCol="0">
-            <a:spAutoFit/>
-          </a:bodyPr>
-          <a:lstStyle/>
-          <a:p>
-            <a:r>
-              <a:rPr lang="pt-BR" sz="1600" b="1" dirty="0">
-                <a:solidFill>
-                  <a:schemeClr val="tx1">
-                    <a:lumMod val="65000"/>
-                    <a:lumOff val="35000"/>
-                  </a:schemeClr>
-                </a:solidFill>
-              </a:rPr>
-              <a:t>Importância da estrutura organizacional da TI</a:t>
-            </a:r>
-          </a:p>
-        </p:txBody>
-      </p:sp>
-    </p:spTree>
-    <p:extLst>
-      <p:ext uri="{BB962C8B-B14F-4D97-AF65-F5344CB8AC3E}">
-        <p14:creationId xmlns:p14="http://schemas.microsoft.com/office/powerpoint/2010/main" val="2201542424"/>
-      </p:ext>
-    </p:extLst>
-  </p:cSld>
-  <p:clrMapOvr>
-    <a:masterClrMapping/>
-  </p:clrMapOvr>
-</p:sld>
-</file>
-
-<file path=ppt/slides/slide21.xml><?xml version="1.0" encoding="utf-8"?>
 <p:sld xmlns:a="http://schemas.openxmlformats.org/drawingml/2006/main" xmlns:r="http://schemas.openxmlformats.org/officeDocument/2006/relationships" xmlns:p="http://schemas.openxmlformats.org/presentationml/2006/main">
   <p:cSld>
     <p:spTree>
@@ -9868,6 +9589,285 @@
     <p:extLst>
       <p:ext uri="{BB962C8B-B14F-4D97-AF65-F5344CB8AC3E}">
         <p14:creationId xmlns:p14="http://schemas.microsoft.com/office/powerpoint/2010/main" val="4205016234"/>
+      </p:ext>
+    </p:extLst>
+  </p:cSld>
+  <p:clrMapOvr>
+    <a:masterClrMapping/>
+  </p:clrMapOvr>
+</p:sld>
+</file>
+
+<file path=ppt/slides/slide21.xml><?xml version="1.0" encoding="utf-8"?>
+<p:sld xmlns:a="http://schemas.openxmlformats.org/drawingml/2006/main" xmlns:r="http://schemas.openxmlformats.org/officeDocument/2006/relationships" xmlns:p="http://schemas.openxmlformats.org/presentationml/2006/main">
+  <p:cSld>
+    <p:spTree>
+      <p:nvGrpSpPr>
+        <p:cNvPr id="1" name=""/>
+        <p:cNvGrpSpPr/>
+        <p:nvPr/>
+      </p:nvGrpSpPr>
+      <p:grpSpPr>
+        <a:xfrm>
+          <a:off x="0" y="0"/>
+          <a:ext cx="0" cy="0"/>
+          <a:chOff x="0" y="0"/>
+          <a:chExt cx="0" cy="0"/>
+        </a:xfrm>
+      </p:grpSpPr>
+      <p:pic>
+        <p:nvPicPr>
+          <p:cNvPr id="16" name="Picture 2"/>
+          <p:cNvPicPr>
+            <a:picLocks noChangeAspect="1" noChangeArrowheads="1"/>
+          </p:cNvPicPr>
+          <p:nvPr/>
+        </p:nvPicPr>
+        <p:blipFill>
+          <a:blip r:embed="rId2">
+            <a:extLst>
+              <a:ext uri="{28A0092B-C50C-407E-A947-70E740481C1C}">
+                <a14:useLocalDpi xmlns:a14="http://schemas.microsoft.com/office/drawing/2010/main" val="0"/>
+              </a:ext>
+            </a:extLst>
+          </a:blip>
+          <a:srcRect/>
+          <a:stretch>
+            <a:fillRect/>
+          </a:stretch>
+        </p:blipFill>
+        <p:spPr bwMode="auto">
+          <a:xfrm>
+            <a:off x="2268894" y="189504"/>
+            <a:ext cx="5958897" cy="4764492"/>
+          </a:xfrm>
+          <a:prstGeom prst="rect">
+            <a:avLst/>
+          </a:prstGeom>
+          <a:noFill/>
+          <a:ln>
+            <a:noFill/>
+          </a:ln>
+          <a:extLst>
+            <a:ext uri="{909E8E84-426E-40DD-AFC4-6F175D3DCCD1}">
+              <a14:hiddenFill xmlns:a14="http://schemas.microsoft.com/office/drawing/2010/main">
+                <a:solidFill>
+                  <a:schemeClr val="accent1"/>
+                </a:solidFill>
+              </a14:hiddenFill>
+            </a:ext>
+            <a:ext uri="{91240B29-F687-4F45-9708-019B960494DF}">
+              <a14:hiddenLine xmlns:a14="http://schemas.microsoft.com/office/drawing/2010/main" w="9525">
+                <a:solidFill>
+                  <a:schemeClr val="tx1"/>
+                </a:solidFill>
+                <a:miter lim="800000"/>
+                <a:headEnd/>
+                <a:tailEnd/>
+              </a14:hiddenLine>
+            </a:ext>
+          </a:extLst>
+        </p:spPr>
+      </p:pic>
+      <p:sp>
+        <p:nvSpPr>
+          <p:cNvPr id="17" name="CaixaDeTexto 16"/>
+          <p:cNvSpPr txBox="1"/>
+          <p:nvPr/>
+        </p:nvSpPr>
+        <p:spPr>
+          <a:xfrm>
+            <a:off x="2571624" y="-16026"/>
+            <a:ext cx="5264322" cy="338554"/>
+          </a:xfrm>
+          <a:prstGeom prst="rect">
+            <a:avLst/>
+          </a:prstGeom>
+          <a:noFill/>
+        </p:spPr>
+        <p:txBody>
+          <a:bodyPr wrap="square" rtlCol="0">
+            <a:spAutoFit/>
+          </a:bodyPr>
+          <a:lstStyle/>
+          <a:p>
+            <a:r>
+              <a:rPr lang="pt-BR" sz="1600" b="1" dirty="0">
+                <a:solidFill>
+                  <a:schemeClr val="tx1">
+                    <a:lumMod val="65000"/>
+                    <a:lumOff val="35000"/>
+                  </a:schemeClr>
+                </a:solidFill>
+              </a:rPr>
+              <a:t>Importância da estrutura organizacional da TI</a:t>
+            </a:r>
+          </a:p>
+        </p:txBody>
+      </p:sp>
+      <p:sp>
+        <p:nvSpPr>
+          <p:cNvPr id="18" name="Retângulo 17">
+            <a:extLst>
+              <a:ext uri="{FF2B5EF4-FFF2-40B4-BE49-F238E27FC236}">
+                <a16:creationId xmlns:a16="http://schemas.microsoft.com/office/drawing/2014/main" id="{188E9D1B-0E6E-4B15-AC88-3D39EC5BE838}"/>
+              </a:ext>
+            </a:extLst>
+          </p:cNvPr>
+          <p:cNvSpPr/>
+          <p:nvPr/>
+        </p:nvSpPr>
+        <p:spPr>
+          <a:xfrm>
+            <a:off x="64513" y="1177591"/>
+            <a:ext cx="2199565" cy="3077766"/>
+          </a:xfrm>
+          <a:prstGeom prst="rect">
+            <a:avLst/>
+          </a:prstGeom>
+        </p:spPr>
+        <p:style>
+          <a:lnRef idx="0">
+            <a:schemeClr val="accent3"/>
+          </a:lnRef>
+          <a:fillRef idx="3">
+            <a:schemeClr val="accent3"/>
+          </a:fillRef>
+          <a:effectRef idx="3">
+            <a:schemeClr val="accent3"/>
+          </a:effectRef>
+          <a:fontRef idx="minor">
+            <a:schemeClr val="lt1"/>
+          </a:fontRef>
+        </p:style>
+        <p:txBody>
+          <a:bodyPr wrap="square">
+            <a:spAutoFit/>
+          </a:bodyPr>
+          <a:lstStyle/>
+          <a:p>
+            <a:pPr>
+              <a:spcAft>
+                <a:spcPts val="1200"/>
+              </a:spcAft>
+              <a:buFont typeface="+mj-lt"/>
+              <a:buAutoNum type="arabicPeriod"/>
+            </a:pPr>
+            <a:r>
+              <a:rPr lang="pt-BR" sz="1600" b="1" dirty="0">
+                <a:solidFill>
+                  <a:schemeClr val="tx1">
+                    <a:lumMod val="65000"/>
+                    <a:lumOff val="35000"/>
+                  </a:schemeClr>
+                </a:solidFill>
+              </a:rPr>
+              <a:t>Especialização do trabalho</a:t>
+            </a:r>
+          </a:p>
+          <a:p>
+            <a:pPr>
+              <a:spcAft>
+                <a:spcPts val="1200"/>
+              </a:spcAft>
+              <a:buFont typeface="+mj-lt"/>
+              <a:buAutoNum type="arabicPeriod"/>
+            </a:pPr>
+            <a:r>
+              <a:rPr lang="pt-BR" sz="1600" b="1" dirty="0">
+                <a:solidFill>
+                  <a:schemeClr val="tx1">
+                    <a:lumMod val="65000"/>
+                    <a:lumOff val="35000"/>
+                  </a:schemeClr>
+                </a:solidFill>
+              </a:rPr>
+              <a:t>Departamentalização</a:t>
+            </a:r>
+          </a:p>
+          <a:p>
+            <a:pPr>
+              <a:spcAft>
+                <a:spcPts val="1200"/>
+              </a:spcAft>
+              <a:buFont typeface="+mj-lt"/>
+              <a:buAutoNum type="arabicPeriod"/>
+            </a:pPr>
+            <a:r>
+              <a:rPr lang="pt-BR" sz="1600" b="1" dirty="0">
+                <a:solidFill>
+                  <a:schemeClr val="tx1">
+                    <a:lumMod val="65000"/>
+                    <a:lumOff val="35000"/>
+                  </a:schemeClr>
+                </a:solidFill>
+              </a:rPr>
+              <a:t>Cadeia de comando</a:t>
+            </a:r>
+          </a:p>
+          <a:p>
+            <a:pPr>
+              <a:spcAft>
+                <a:spcPts val="1200"/>
+              </a:spcAft>
+              <a:buFont typeface="+mj-lt"/>
+              <a:buAutoNum type="arabicPeriod"/>
+            </a:pPr>
+            <a:r>
+              <a:rPr lang="pt-BR" sz="1600" b="1" dirty="0">
+                <a:solidFill>
+                  <a:schemeClr val="tx1">
+                    <a:lumMod val="65000"/>
+                    <a:lumOff val="35000"/>
+                  </a:schemeClr>
+                </a:solidFill>
+              </a:rPr>
+              <a:t>Amplitude de controle</a:t>
+            </a:r>
+          </a:p>
+          <a:p>
+            <a:pPr>
+              <a:spcAft>
+                <a:spcPts val="1200"/>
+              </a:spcAft>
+              <a:buFont typeface="+mj-lt"/>
+              <a:buAutoNum type="arabicPeriod"/>
+            </a:pPr>
+            <a:r>
+              <a:rPr lang="pt-BR" sz="1600" b="1" dirty="0">
+                <a:solidFill>
+                  <a:schemeClr val="tx1">
+                    <a:lumMod val="65000"/>
+                    <a:lumOff val="35000"/>
+                  </a:schemeClr>
+                </a:solidFill>
+              </a:rPr>
+              <a:t>Centralização e descentralização</a:t>
+            </a:r>
+          </a:p>
+          <a:p>
+            <a:pPr>
+              <a:spcAft>
+                <a:spcPts val="1200"/>
+              </a:spcAft>
+              <a:buFont typeface="+mj-lt"/>
+              <a:buAutoNum type="arabicPeriod"/>
+            </a:pPr>
+            <a:r>
+              <a:rPr lang="pt-BR" sz="1600" b="1" dirty="0">
+                <a:solidFill>
+                  <a:srgbClr val="0066FF"/>
+                </a:solidFill>
+              </a:rPr>
+              <a:t>Formalização</a:t>
+            </a:r>
+          </a:p>
+        </p:txBody>
+      </p:sp>
+    </p:spTree>
+    <p:extLst>
+      <p:ext uri="{BB962C8B-B14F-4D97-AF65-F5344CB8AC3E}">
+        <p14:creationId xmlns:p14="http://schemas.microsoft.com/office/powerpoint/2010/main" val="1288245862"/>
       </p:ext>
     </p:extLst>
   </p:cSld>

</xml_diff>